<commit_message>
Edits to TIF-Ignite + PDF version
</commit_message>
<xml_diff>
--- a/TIF-Ignite.pptx
+++ b/TIF-Ignite.pptx
@@ -203,7 +203,7 @@
           <a:p>
             <a:fld id="{3AF8D1B2-0A1C-4E95-B09A-497F170451A9}" type="datetimeFigureOut">
               <a:rPr lang="en-US" smtClean="0"/>
-              <a:t>3/18/2012</a:t>
+              <a:t>3/19/2012</a:t>
             </a:fld>
             <a:endParaRPr lang="en-US"/>
           </a:p>
@@ -4350,21 +4350,8 @@
                   <a:schemeClr val="bg1"/>
                 </a:solidFill>
               </a:rPr>
-              <a:t>Agile, Secure Cloud </a:t>
-            </a:r>
-            <a:r>
-              <a:rPr lang="en-US" dirty="0" smtClean="0">
-                <a:solidFill>
-                  <a:schemeClr val="bg1"/>
-                </a:solidFill>
-              </a:rPr>
-              <a:t>Applications @ UC Davis</a:t>
-            </a:r>
-            <a:endParaRPr lang="en-US" dirty="0" smtClean="0">
-              <a:solidFill>
-                <a:schemeClr val="bg1"/>
-              </a:solidFill>
-            </a:endParaRPr>
+              <a:t>Agile, Secure Cloud Applications @ UC Davis</a:t>
+            </a:r>
           </a:p>
         </p:txBody>
       </p:sp>
@@ -4484,13 +4471,6 @@
               </a:rPr>
               <a:t>TIF Ignite Session</a:t>
             </a:r>
-            <a:endParaRPr lang="en-US" dirty="0" smtClean="0">
-              <a:solidFill>
-                <a:schemeClr val="tx2">
-                  <a:lumMod val="75000"/>
-                </a:schemeClr>
-              </a:solidFill>
-            </a:endParaRPr>
           </a:p>
           <a:p>
             <a:r>
@@ -4503,13 +4483,6 @@
               </a:rPr>
               <a:t>March 28, 2012</a:t>
             </a:r>
-            <a:endParaRPr lang="en-US" dirty="0" smtClean="0">
-              <a:solidFill>
-                <a:schemeClr val="tx2">
-                  <a:lumMod val="75000"/>
-                </a:schemeClr>
-              </a:solidFill>
-            </a:endParaRPr>
           </a:p>
           <a:p>
             <a:r>
@@ -4520,25 +4493,8 @@
                   </a:schemeClr>
                 </a:solidFill>
               </a:rPr>
-              <a:t>University of California </a:t>
-            </a:r>
-            <a:r>
-              <a:rPr lang="en-US" dirty="0" smtClean="0">
-                <a:solidFill>
-                  <a:schemeClr val="tx2">
-                    <a:lumMod val="75000"/>
-                  </a:schemeClr>
-                </a:solidFill>
-              </a:rPr>
-              <a:t>Davis</a:t>
-            </a:r>
-            <a:endParaRPr lang="en-US" dirty="0" smtClean="0">
-              <a:solidFill>
-                <a:schemeClr val="tx2">
-                  <a:lumMod val="75000"/>
-                </a:schemeClr>
-              </a:solidFill>
-            </a:endParaRPr>
+              <a:t>University of California Davis</a:t>
+            </a:r>
           </a:p>
         </p:txBody>
       </p:sp>
@@ -4618,100 +4574,129 @@
           <a:lstStyle/>
           <a:p>
             <a:r>
-              <a:rPr lang="en-US" sz="2800" dirty="0" smtClean="0"/>
+              <a:rPr lang="en-US" sz="2000" dirty="0" smtClean="0"/>
               <a:t>Authentication</a:t>
             </a:r>
-            <a:endParaRPr lang="en-US" sz="2800" dirty="0"/>
+            <a:endParaRPr lang="en-US" sz="2000" dirty="0"/>
           </a:p>
           <a:p>
             <a:pPr lvl="1"/>
             <a:r>
-              <a:rPr lang="en-US" dirty="0" smtClean="0"/>
+              <a:rPr lang="en-US" sz="2000" dirty="0" smtClean="0"/>
               <a:t>CAS is UC Davis only, difficult for “post-PC” devices</a:t>
             </a:r>
           </a:p>
           <a:p>
             <a:pPr lvl="1"/>
             <a:r>
-              <a:rPr lang="en-US" dirty="0" smtClean="0"/>
+              <a:rPr lang="en-US" sz="2000" dirty="0" smtClean="0"/>
               <a:t>Shibboleth </a:t>
             </a:r>
             <a:r>
-              <a:rPr lang="en-US" dirty="0"/>
+              <a:rPr lang="en-US" sz="2000" dirty="0"/>
               <a:t>is hard to setup, </a:t>
             </a:r>
             <a:r>
-              <a:rPr lang="en-US" dirty="0" smtClean="0"/>
+              <a:rPr lang="en-US" sz="2000" dirty="0" smtClean="0"/>
               <a:t>hard to use</a:t>
             </a:r>
             <a:r>
-              <a:rPr lang="en-US" dirty="0"/>
+              <a:rPr lang="en-US" sz="2000" dirty="0"/>
               <a:t>, </a:t>
             </a:r>
             <a:r>
-              <a:rPr lang="en-US" dirty="0" smtClean="0"/>
+              <a:rPr lang="en-US" sz="2000" dirty="0" smtClean="0"/>
               <a:t>narrow in scope</a:t>
             </a:r>
-            <a:endParaRPr lang="en-US" dirty="0"/>
+            <a:endParaRPr lang="en-US" sz="2000" dirty="0"/>
           </a:p>
           <a:p>
             <a:pPr lvl="1"/>
             <a:r>
-              <a:rPr lang="en-US" dirty="0" err="1" smtClean="0"/>
+              <a:rPr lang="en-US" sz="2000" dirty="0" err="1" smtClean="0"/>
               <a:t>OAuth</a:t>
             </a:r>
             <a:r>
-              <a:rPr lang="en-US" dirty="0" smtClean="0"/>
+              <a:rPr lang="en-US" sz="2000" dirty="0" smtClean="0"/>
               <a:t> </a:t>
             </a:r>
             <a:r>
-              <a:rPr lang="en-US" dirty="0"/>
+              <a:rPr lang="en-US" sz="2000" dirty="0"/>
               <a:t>2.0 is the rest of the web</a:t>
             </a:r>
           </a:p>
           <a:p>
             <a:pPr lvl="2"/>
             <a:r>
-              <a:rPr lang="en-US" sz="2800" dirty="0"/>
+              <a:rPr lang="en-US" sz="2000" dirty="0"/>
               <a:t>Google, Facebook, major cloud providers</a:t>
             </a:r>
           </a:p>
           <a:p>
             <a:pPr lvl="2"/>
             <a:r>
-              <a:rPr lang="en-US" sz="2800" dirty="0"/>
+              <a:rPr lang="en-US" sz="2000" dirty="0"/>
               <a:t>Why not UC</a:t>
             </a:r>
             <a:r>
-              <a:rPr lang="en-US" sz="2800" dirty="0" smtClean="0"/>
+              <a:rPr lang="en-US" sz="2000" dirty="0" smtClean="0"/>
               <a:t>?</a:t>
             </a:r>
           </a:p>
           <a:p>
             <a:r>
-              <a:rPr lang="en-US" sz="2800" dirty="0"/>
+              <a:rPr lang="en-US" sz="2000" dirty="0"/>
               <a:t>Non-secured </a:t>
             </a:r>
             <a:r>
-              <a:rPr lang="en-US" sz="2800" dirty="0" smtClean="0"/>
+              <a:rPr lang="en-US" sz="2000" dirty="0" smtClean="0"/>
               <a:t>APIs (hint: </a:t>
             </a:r>
             <a:r>
-              <a:rPr lang="en-US" sz="2800" dirty="0" err="1" smtClean="0"/>
+              <a:rPr lang="en-US" sz="2000" dirty="0" err="1" smtClean="0"/>
               <a:t>OAuth</a:t>
             </a:r>
             <a:r>
-              <a:rPr lang="en-US" sz="2800" dirty="0" smtClean="0"/>
-              <a:t> 2.0)</a:t>
-            </a:r>
-            <a:endParaRPr lang="en-US" sz="2800" dirty="0"/>
-          </a:p>
-          <a:p>
-            <a:r>
-              <a:rPr lang="en-US" sz="2800" dirty="0" smtClean="0"/>
-              <a:t>Authorization</a:t>
-            </a:r>
-            <a:endParaRPr lang="en-US" sz="2800" dirty="0"/>
+              <a:rPr lang="en-US" sz="2000" dirty="0" smtClean="0"/>
+              <a:t> 2.0</a:t>
+            </a:r>
+            <a:r>
+              <a:rPr lang="en-US" sz="2000" dirty="0" smtClean="0"/>
+              <a:t>)</a:t>
+            </a:r>
+          </a:p>
+          <a:p>
+            <a:pPr lvl="1"/>
+            <a:r>
+              <a:rPr lang="en-US" sz="2000" dirty="0" smtClean="0"/>
+              <a:t>SOAP is insecure without a shared secret</a:t>
+            </a:r>
+          </a:p>
+          <a:p>
+            <a:pPr lvl="1"/>
+            <a:r>
+              <a:rPr lang="en-US" sz="2000" dirty="0" smtClean="0"/>
+              <a:t>With a shared secret, it’s difficult to mange</a:t>
+            </a:r>
+            <a:endParaRPr lang="en-US" sz="2000" dirty="0"/>
+          </a:p>
+          <a:p>
+            <a:r>
+              <a:rPr lang="en-US" sz="2000" dirty="0" smtClean="0"/>
+              <a:t>Authorization (API)</a:t>
+            </a:r>
+          </a:p>
+          <a:p>
+            <a:pPr lvl="1"/>
+            <a:r>
+              <a:rPr lang="en-US" sz="2000" dirty="0" err="1" smtClean="0"/>
+              <a:t>CatBert</a:t>
+            </a:r>
+            <a:r>
+              <a:rPr lang="en-US" sz="2000" dirty="0" smtClean="0"/>
+              <a:t> v4 is a web API for Authorization</a:t>
+            </a:r>
+            <a:endParaRPr lang="en-US" sz="2000" dirty="0"/>
           </a:p>
         </p:txBody>
       </p:sp>
@@ -4789,24 +4774,127 @@
           <a:lstStyle/>
           <a:p>
             <a:r>
-              <a:rPr lang="en-US" dirty="0" smtClean="0"/>
+              <a:rPr lang="en-US" sz="1800" dirty="0" smtClean="0"/>
               <a:t>Not Invented Here syndrome</a:t>
             </a:r>
           </a:p>
           <a:p>
             <a:r>
-              <a:rPr lang="en-US" dirty="0" smtClean="0"/>
-              <a:t>We’re not Sharing enough! (i.e. useless language/tool debates, service catalogs)</a:t>
-            </a:r>
+              <a:rPr lang="en-US" sz="1800" dirty="0" smtClean="0"/>
+              <a:t>We’re </a:t>
+            </a:r>
+            <a:r>
+              <a:rPr lang="en-US" sz="1800" dirty="0" smtClean="0"/>
+              <a:t>Not </a:t>
+            </a:r>
+            <a:r>
+              <a:rPr lang="en-US" sz="1800" dirty="0" smtClean="0"/>
+              <a:t>Sharing </a:t>
+            </a:r>
+            <a:r>
+              <a:rPr lang="en-US" sz="1800" dirty="0" smtClean="0"/>
+              <a:t>Enough</a:t>
+            </a:r>
+            <a:r>
+              <a:rPr lang="en-US" sz="1800" dirty="0" smtClean="0"/>
+              <a:t>! (i.e. useless language/tool debates, service catalogs</a:t>
+            </a:r>
+            <a:r>
+              <a:rPr lang="en-US" sz="1800" dirty="0" smtClean="0"/>
+              <a:t>)</a:t>
+            </a:r>
+          </a:p>
+          <a:p>
+            <a:pPr lvl="1"/>
+            <a:r>
+              <a:rPr lang="en-US" sz="1800" dirty="0" smtClean="0"/>
+              <a:t>It’s not about the language or tool</a:t>
+            </a:r>
+          </a:p>
+          <a:p>
+            <a:pPr lvl="1"/>
+            <a:r>
+              <a:rPr lang="en-US" sz="1800" dirty="0" smtClean="0"/>
+              <a:t>It’s about usable, actionable Software Development Standards!</a:t>
+            </a:r>
+          </a:p>
+          <a:p>
+            <a:pPr lvl="1"/>
+            <a:r>
+              <a:rPr lang="en-US" sz="1800" dirty="0" smtClean="0"/>
+              <a:t>And documentation (LP)</a:t>
+            </a:r>
+          </a:p>
+          <a:p>
+            <a:pPr lvl="2"/>
+            <a:r>
+              <a:rPr lang="en-US" sz="1800" dirty="0" smtClean="0"/>
+              <a:t>Comments are NOT sufficient documentation</a:t>
+            </a:r>
+          </a:p>
+          <a:p>
+            <a:pPr lvl="2"/>
+            <a:r>
+              <a:rPr lang="en-US" sz="1800" dirty="0" smtClean="0"/>
+              <a:t>Test cases are NOT “executable” documentation</a:t>
+            </a:r>
+          </a:p>
+          <a:p>
+            <a:pPr lvl="2"/>
+            <a:r>
+              <a:rPr lang="en-US" sz="1800" dirty="0" smtClean="0"/>
+              <a:t>Need to know Why something was done, not How</a:t>
+            </a:r>
+          </a:p>
+          <a:p>
+            <a:pPr lvl="1"/>
+            <a:r>
+              <a:rPr lang="en-US" sz="1800" dirty="0" smtClean="0"/>
+              <a:t>And a Service Catalog</a:t>
+            </a:r>
+          </a:p>
+          <a:p>
+            <a:pPr lvl="1"/>
+            <a:r>
+              <a:rPr lang="en-US" sz="1800" dirty="0" smtClean="0"/>
+              <a:t>Using well-known APIs (</a:t>
+            </a:r>
+            <a:r>
+              <a:rPr lang="en-US" sz="1800" dirty="0" err="1" smtClean="0"/>
+              <a:t>RESTFul</a:t>
+            </a:r>
+            <a:r>
+              <a:rPr lang="en-US" sz="1800" dirty="0" smtClean="0"/>
+              <a:t>, </a:t>
+            </a:r>
+            <a:r>
+              <a:rPr lang="en-US" sz="1800" dirty="0" err="1" smtClean="0"/>
+              <a:t>OAuth</a:t>
+            </a:r>
+            <a:r>
+              <a:rPr lang="en-US" sz="1800" dirty="0" smtClean="0"/>
+              <a:t>, etc.)</a:t>
+            </a:r>
+            <a:endParaRPr lang="en-US" sz="1800" dirty="0" smtClean="0"/>
           </a:p>
           <a:p>
             <a:pPr marL="0" indent="0">
               <a:buNone/>
             </a:pPr>
             <a:r>
-              <a:rPr lang="en-US" dirty="0" smtClean="0"/>
+              <a:rPr lang="en-US" sz="1800" dirty="0" smtClean="0"/>
               <a:t>=  We are still working on the balance between central and departmental services</a:t>
             </a:r>
+          </a:p>
+          <a:p>
+            <a:pPr marL="0" indent="0">
+              <a:buNone/>
+            </a:pPr>
+            <a:r>
+              <a:rPr lang="en-US" sz="1800" dirty="0" smtClean="0"/>
+              <a:t>=  Better Collaboration</a:t>
+            </a:r>
+            <a:endParaRPr lang="en-US" sz="1800" dirty="0" smtClean="0"/>
           </a:p>
         </p:txBody>
       </p:sp>
@@ -4880,11 +4968,6 @@
               </a:rPr>
               <a:t>Let’s fix it together!</a:t>
             </a:r>
-            <a:endParaRPr lang="en-US" dirty="0" smtClean="0">
-              <a:solidFill>
-                <a:schemeClr val="bg1"/>
-              </a:solidFill>
-            </a:endParaRPr>
           </a:p>
         </p:txBody>
       </p:sp>
@@ -5004,13 +5087,6 @@
               </a:rPr>
               <a:t>TIF Ignite Session</a:t>
             </a:r>
-            <a:endParaRPr lang="en-US" dirty="0" smtClean="0">
-              <a:solidFill>
-                <a:schemeClr val="tx2">
-                  <a:lumMod val="75000"/>
-                </a:schemeClr>
-              </a:solidFill>
-            </a:endParaRPr>
           </a:p>
           <a:p>
             <a:r>
@@ -5023,13 +5099,6 @@
               </a:rPr>
               <a:t>March 28, 2012</a:t>
             </a:r>
-            <a:endParaRPr lang="en-US" dirty="0" smtClean="0">
-              <a:solidFill>
-                <a:schemeClr val="tx2">
-                  <a:lumMod val="75000"/>
-                </a:schemeClr>
-              </a:solidFill>
-            </a:endParaRPr>
           </a:p>
           <a:p>
             <a:r>
@@ -5040,25 +5109,8 @@
                   </a:schemeClr>
                 </a:solidFill>
               </a:rPr>
-              <a:t>University of California </a:t>
-            </a:r>
-            <a:r>
-              <a:rPr lang="en-US" dirty="0" smtClean="0">
-                <a:solidFill>
-                  <a:schemeClr val="tx2">
-                    <a:lumMod val="75000"/>
-                  </a:schemeClr>
-                </a:solidFill>
-              </a:rPr>
-              <a:t>Davis</a:t>
-            </a:r>
-            <a:endParaRPr lang="en-US" dirty="0" smtClean="0">
-              <a:solidFill>
-                <a:schemeClr val="tx2">
-                  <a:lumMod val="75000"/>
-                </a:schemeClr>
-              </a:solidFill>
-            </a:endParaRPr>
+              <a:t>University of California Davis</a:t>
+            </a:r>
           </a:p>
         </p:txBody>
       </p:sp>
@@ -5116,7 +5168,15 @@
           <a:p>
             <a:r>
               <a:rPr lang="en-US" dirty="0" smtClean="0"/>
-              <a:t>Online Pre-Purchasing in 6 months</a:t>
+              <a:t>Online Pre-Purchasing in </a:t>
+            </a:r>
+            <a:r>
+              <a:rPr lang="en-US" dirty="0" smtClean="0"/>
+              <a:t>7 </a:t>
+            </a:r>
+            <a:r>
+              <a:rPr lang="en-US" dirty="0" smtClean="0"/>
+              <a:t>months</a:t>
             </a:r>
             <a:endParaRPr lang="en-US" dirty="0"/>
           </a:p>
@@ -5137,6 +5197,18 @@
           <a:bodyPr/>
           <a:lstStyle/>
           <a:p>
+            <a:r>
+              <a:rPr lang="en-US" dirty="0" smtClean="0"/>
+              <a:t>(Show pretty </a:t>
+            </a:r>
+            <a:r>
+              <a:rPr lang="en-US" dirty="0" err="1" smtClean="0"/>
+              <a:t>graphcs</a:t>
+            </a:r>
+            <a:r>
+              <a:rPr lang="en-US" dirty="0" smtClean="0"/>
+              <a:t> on GitHub)</a:t>
+            </a:r>
             <a:endParaRPr lang="en-US" dirty="0"/>
           </a:p>
         </p:txBody>
@@ -5188,7 +5260,15 @@
           <a:p>
             <a:r>
               <a:rPr lang="en-US" dirty="0" smtClean="0"/>
-              <a:t>Online Pre-Purchasing in 6 months</a:t>
+              <a:t>Online Pre-Purchasing in </a:t>
+            </a:r>
+            <a:r>
+              <a:rPr lang="en-US" dirty="0" smtClean="0"/>
+              <a:t>7 </a:t>
+            </a:r>
+            <a:r>
+              <a:rPr lang="en-US" dirty="0" smtClean="0"/>
+              <a:t>months</a:t>
             </a:r>
             <a:endParaRPr lang="en-US" dirty="0"/>
           </a:p>
@@ -5209,7 +5289,82 @@
           <a:bodyPr/>
           <a:lstStyle/>
           <a:p>
-            <a:endParaRPr lang="en-US" dirty="0"/>
+            <a:r>
+              <a:rPr lang="en-US" sz="2400" dirty="0" smtClean="0"/>
+              <a:t>Agile development using </a:t>
+            </a:r>
+            <a:r>
+              <a:rPr lang="en-US" sz="2400" dirty="0" err="1" smtClean="0"/>
+              <a:t>Trello</a:t>
+            </a:r>
+            <a:r>
+              <a:rPr lang="en-US" sz="2400" dirty="0" smtClean="0"/>
+              <a:t> for user stories, GitHub for source code management/collaboration, and TeamCity for Continuous Integration (and eventually, deployment!)</a:t>
+            </a:r>
+          </a:p>
+          <a:p>
+            <a:r>
+              <a:rPr lang="en-US" sz="2400" dirty="0" smtClean="0"/>
+              <a:t>Battle-tested architecture using JavaScript front end (</a:t>
+            </a:r>
+            <a:r>
+              <a:rPr lang="en-US" sz="2400" dirty="0" err="1" smtClean="0"/>
+              <a:t>jQuery</a:t>
+            </a:r>
+            <a:r>
+              <a:rPr lang="en-US" sz="2400" dirty="0" smtClean="0"/>
+              <a:t>, knockout,) UCDArch (MVC, </a:t>
+            </a:r>
+            <a:r>
+              <a:rPr lang="en-US" sz="2400" dirty="0" err="1" smtClean="0"/>
+              <a:t>Nhibernate</a:t>
+            </a:r>
+            <a:r>
+              <a:rPr lang="en-US" sz="2400" dirty="0" smtClean="0"/>
+              <a:t>, CAS, </a:t>
+            </a:r>
+            <a:r>
+              <a:rPr lang="en-US" sz="2400" dirty="0" err="1" smtClean="0"/>
+              <a:t>etc</a:t>
+            </a:r>
+            <a:r>
+              <a:rPr lang="en-US" sz="2400" dirty="0" smtClean="0"/>
+              <a:t>) middle layer, SQL server backend, SOAP APIs </a:t>
+            </a:r>
+          </a:p>
+          <a:p>
+            <a:r>
+              <a:rPr lang="en-US" sz="2400" dirty="0" smtClean="0"/>
+              <a:t>Cloud infrastructure using </a:t>
+            </a:r>
+            <a:r>
+              <a:rPr lang="en-US" sz="2400" dirty="0" err="1" smtClean="0"/>
+              <a:t>Ganeti</a:t>
+            </a:r>
+            <a:r>
+              <a:rPr lang="en-US" sz="2400" dirty="0" smtClean="0"/>
+              <a:t>, managed by CSE (Bill </a:t>
+            </a:r>
+            <a:r>
+              <a:rPr lang="en-US" sz="2400" dirty="0" err="1" smtClean="0"/>
+              <a:t>Broadley</a:t>
+            </a:r>
+            <a:r>
+              <a:rPr lang="en-US" sz="2400" dirty="0" smtClean="0"/>
+              <a:t>) and running in the </a:t>
+            </a:r>
+            <a:r>
+              <a:rPr lang="en-US" sz="2400" dirty="0" err="1" smtClean="0"/>
+              <a:t>DataCenter</a:t>
+            </a:r>
+            <a:endParaRPr lang="en-US" sz="2400" dirty="0" smtClean="0"/>
+          </a:p>
+          <a:p>
+            <a:r>
+              <a:rPr lang="en-US" sz="2400" dirty="0" smtClean="0"/>
+              <a:t>UserVoice for feedback</a:t>
+            </a:r>
+            <a:endParaRPr lang="en-US" sz="2400" dirty="0"/>
           </a:p>
         </p:txBody>
       </p:sp>
@@ -5613,11 +5768,6 @@
               </a:rPr>
               <a:t>Programmer (noun): An organism that can turn caffeine and alcohol into code*</a:t>
             </a:r>
-            <a:endParaRPr lang="en-US" dirty="0">
-              <a:solidFill>
-                <a:srgbClr val="000000"/>
-              </a:solidFill>
-            </a:endParaRPr>
           </a:p>
         </p:txBody>
       </p:sp>

</xml_diff>

<commit_message>
Separated TIF-Ignite and Online Pre-Purchasing presentations
</commit_message>
<xml_diff>
--- a/TIF-Ignite.pptx
+++ b/TIF-Ignite.pptx
@@ -5,21 +5,20 @@
     <p:sldMasterId id="2147483672" r:id="rId1"/>
   </p:sldMasterIdLst>
   <p:notesMasterIdLst>
-    <p:notesMasterId r:id="rId14"/>
+    <p:notesMasterId r:id="rId13"/>
   </p:notesMasterIdLst>
   <p:sldIdLst>
     <p:sldId id="257" r:id="rId2"/>
-    <p:sldId id="258" r:id="rId3"/>
-    <p:sldId id="269" r:id="rId4"/>
-    <p:sldId id="259" r:id="rId5"/>
-    <p:sldId id="267" r:id="rId6"/>
-    <p:sldId id="261" r:id="rId7"/>
-    <p:sldId id="262" r:id="rId8"/>
-    <p:sldId id="268" r:id="rId9"/>
-    <p:sldId id="264" r:id="rId10"/>
-    <p:sldId id="263" r:id="rId11"/>
-    <p:sldId id="260" r:id="rId12"/>
-    <p:sldId id="266" r:id="rId13"/>
+    <p:sldId id="269" r:id="rId3"/>
+    <p:sldId id="260" r:id="rId4"/>
+    <p:sldId id="271" r:id="rId5"/>
+    <p:sldId id="261" r:id="rId6"/>
+    <p:sldId id="262" r:id="rId7"/>
+    <p:sldId id="273" r:id="rId8"/>
+    <p:sldId id="264" r:id="rId9"/>
+    <p:sldId id="263" r:id="rId10"/>
+    <p:sldId id="270" r:id="rId11"/>
+    <p:sldId id="266" r:id="rId12"/>
   </p:sldIdLst>
   <p:sldSz cx="9144000" cy="6858000" type="screen4x3"/>
   <p:notesSz cx="6858000" cy="9144000"/>
@@ -203,7 +202,7 @@
           <a:p>
             <a:fld id="{3AF8D1B2-0A1C-4E95-B09A-497F170451A9}" type="datetimeFigureOut">
               <a:rPr lang="en-US" smtClean="0"/>
-              <a:t>3/19/2012</a:t>
+              <a:t>3/27/2012</a:t>
             </a:fld>
             <a:endParaRPr lang="en-US"/>
           </a:p>
@@ -713,7 +712,7 @@
                 </a:solidFill>
               </a:rPr>
               <a:pPr eaLnBrk="1" hangingPunct="1"/>
-              <a:t>7</a:t>
+              <a:t>6</a:t>
             </a:fld>
             <a:endParaRPr lang="es-UY" smtClean="0">
               <a:solidFill>
@@ -4350,7 +4349,15 @@
                   <a:schemeClr val="bg1"/>
                 </a:solidFill>
               </a:rPr>
-              <a:t>Agile, Secure Cloud Applications @ UC Davis</a:t>
+              <a:t>Agile Software Development @ </a:t>
+            </a:r>
+            <a:r>
+              <a:rPr lang="en-US" dirty="0" smtClean="0">
+                <a:solidFill>
+                  <a:schemeClr val="bg1"/>
+                </a:solidFill>
+              </a:rPr>
+              <a:t>UC Davis</a:t>
             </a:r>
           </a:p>
         </p:txBody>
@@ -4552,7 +4559,7 @@
           <a:p>
             <a:r>
               <a:rPr lang="en-US" dirty="0" smtClean="0"/>
-              <a:t>What we’re doing wrong</a:t>
+              <a:t>Services</a:t>
             </a:r>
             <a:endParaRPr lang="en-US" dirty="0"/>
           </a:p>
@@ -4574,55 +4581,33 @@
           <a:lstStyle/>
           <a:p>
             <a:r>
-              <a:rPr lang="en-US" sz="2000" dirty="0" smtClean="0"/>
+              <a:rPr lang="en-US" sz="2000" dirty="0"/>
               <a:t>Authentication</a:t>
             </a:r>
-            <a:endParaRPr lang="en-US" sz="2000" dirty="0"/>
           </a:p>
           <a:p>
             <a:pPr lvl="1"/>
             <a:r>
-              <a:rPr lang="en-US" sz="2000" dirty="0" smtClean="0"/>
+              <a:rPr lang="en-US" sz="2000" dirty="0"/>
               <a:t>CAS is UC Davis only, difficult for “post-PC” devices</a:t>
             </a:r>
           </a:p>
           <a:p>
             <a:pPr lvl="1"/>
             <a:r>
-              <a:rPr lang="en-US" sz="2000" dirty="0" smtClean="0"/>
-              <a:t>Shibboleth </a:t>
-            </a:r>
-            <a:r>
               <a:rPr lang="en-US" sz="2000" dirty="0"/>
-              <a:t>is hard to setup, </a:t>
-            </a:r>
-            <a:r>
-              <a:rPr lang="en-US" sz="2000" dirty="0" smtClean="0"/>
-              <a:t>hard to use</a:t>
+              <a:t>Shibboleth is hard to setup, hard to use, narrow in scope</a:t>
+            </a:r>
+          </a:p>
+          <a:p>
+            <a:pPr lvl="1"/>
+            <a:r>
+              <a:rPr lang="en-US" sz="2000" dirty="0" err="1"/>
+              <a:t>OAuth</a:t>
             </a:r>
             <a:r>
               <a:rPr lang="en-US" sz="2000" dirty="0"/>
-              <a:t>, </a:t>
-            </a:r>
-            <a:r>
-              <a:rPr lang="en-US" sz="2000" dirty="0" smtClean="0"/>
-              <a:t>narrow in scope</a:t>
-            </a:r>
-            <a:endParaRPr lang="en-US" sz="2000" dirty="0"/>
-          </a:p>
-          <a:p>
-            <a:pPr lvl="1"/>
-            <a:r>
-              <a:rPr lang="en-US" sz="2000" dirty="0" err="1" smtClean="0"/>
-              <a:t>OAuth</a:t>
-            </a:r>
-            <a:r>
-              <a:rPr lang="en-US" sz="2000" dirty="0" smtClean="0"/>
-              <a:t> </a:t>
-            </a:r>
-            <a:r>
-              <a:rPr lang="en-US" sz="2000" dirty="0"/>
-              <a:t>2.0 is the rest of the web</a:t>
+              <a:t> 2.0 is the rest of the web</a:t>
             </a:r>
           </a:p>
           <a:p>
@@ -4636,74 +4621,61 @@
             <a:pPr lvl="2"/>
             <a:r>
               <a:rPr lang="en-US" sz="2000" dirty="0"/>
-              <a:t>Why not UC</a:t>
-            </a:r>
-            <a:r>
-              <a:rPr lang="en-US" sz="2000" dirty="0" smtClean="0"/>
-              <a:t>?</a:t>
+              <a:t>Why not UC?</a:t>
             </a:r>
           </a:p>
           <a:p>
             <a:r>
               <a:rPr lang="en-US" sz="2000" dirty="0"/>
-              <a:t>Non-secured </a:t>
-            </a:r>
-            <a:r>
-              <a:rPr lang="en-US" sz="2000" dirty="0" smtClean="0"/>
-              <a:t>APIs (hint: </a:t>
-            </a:r>
-            <a:r>
-              <a:rPr lang="en-US" sz="2000" dirty="0" err="1" smtClean="0"/>
+              <a:t>Non-secured APIs (hint: </a:t>
+            </a:r>
+            <a:r>
+              <a:rPr lang="en-US" sz="2000" dirty="0" err="1"/>
               <a:t>OAuth</a:t>
             </a:r>
             <a:r>
-              <a:rPr lang="en-US" sz="2000" dirty="0" smtClean="0"/>
-              <a:t> 2.0</a:t>
-            </a:r>
-            <a:r>
-              <a:rPr lang="en-US" sz="2000" dirty="0" smtClean="0"/>
-              <a:t>)</a:t>
+              <a:rPr lang="en-US" sz="2000" dirty="0"/>
+              <a:t> 2.0)</a:t>
             </a:r>
           </a:p>
           <a:p>
             <a:pPr lvl="1"/>
             <a:r>
-              <a:rPr lang="en-US" sz="2000" dirty="0" smtClean="0"/>
+              <a:rPr lang="en-US" sz="2000" dirty="0"/>
               <a:t>SOAP is insecure without a shared secret</a:t>
             </a:r>
           </a:p>
           <a:p>
             <a:pPr lvl="1"/>
             <a:r>
-              <a:rPr lang="en-US" sz="2000" dirty="0" smtClean="0"/>
+              <a:rPr lang="en-US" sz="2000" dirty="0"/>
               <a:t>With a shared secret, it’s difficult to mange</a:t>
             </a:r>
-            <a:endParaRPr lang="en-US" sz="2000" dirty="0"/>
-          </a:p>
-          <a:p>
-            <a:r>
-              <a:rPr lang="en-US" sz="2000" dirty="0" smtClean="0"/>
+          </a:p>
+          <a:p>
+            <a:r>
+              <a:rPr lang="en-US" sz="2000" dirty="0"/>
               <a:t>Authorization (API)</a:t>
             </a:r>
           </a:p>
           <a:p>
             <a:pPr lvl="1"/>
             <a:r>
-              <a:rPr lang="en-US" sz="2000" dirty="0" err="1" smtClean="0"/>
+              <a:rPr lang="en-US" sz="2000" dirty="0" err="1"/>
               <a:t>CatBert</a:t>
             </a:r>
             <a:r>
-              <a:rPr lang="en-US" sz="2000" dirty="0" smtClean="0"/>
+              <a:rPr lang="en-US" sz="2000" dirty="0"/>
               <a:t> v4 is a web API for Authorization</a:t>
             </a:r>
-            <a:endParaRPr lang="en-US" sz="2000" dirty="0"/>
+            <a:endParaRPr lang="en-US" dirty="0"/>
           </a:p>
         </p:txBody>
       </p:sp>
     </p:spTree>
     <p:extLst>
       <p:ext uri="{BB962C8B-B14F-4D97-AF65-F5344CB8AC3E}">
-        <p14:creationId xmlns:p14="http://schemas.microsoft.com/office/powerpoint/2010/main" val="2660073888"/>
+        <p14:creationId xmlns:p14="http://schemas.microsoft.com/office/powerpoint/2010/main" val="1353530053"/>
       </p:ext>
     </p:extLst>
   </p:cSld>
@@ -4714,204 +4686,6 @@
 </file>
 
 <file path=ppt/slides/slide11.xml><?xml version="1.0" encoding="utf-8"?>
-<p:sld xmlns:a="http://schemas.openxmlformats.org/drawingml/2006/main" xmlns:r="http://schemas.openxmlformats.org/officeDocument/2006/relationships" xmlns:p="http://schemas.openxmlformats.org/presentationml/2006/main">
-  <p:cSld>
-    <p:spTree>
-      <p:nvGrpSpPr>
-        <p:cNvPr id="1" name=""/>
-        <p:cNvGrpSpPr/>
-        <p:nvPr/>
-      </p:nvGrpSpPr>
-      <p:grpSpPr>
-        <a:xfrm>
-          <a:off x="0" y="0"/>
-          <a:ext cx="0" cy="0"/>
-          <a:chOff x="0" y="0"/>
-          <a:chExt cx="0" cy="0"/>
-        </a:xfrm>
-      </p:grpSpPr>
-      <p:sp>
-        <p:nvSpPr>
-          <p:cNvPr id="2" name="Title 1"/>
-          <p:cNvSpPr>
-            <a:spLocks noGrp="1"/>
-          </p:cNvSpPr>
-          <p:nvPr>
-            <p:ph type="title"/>
-          </p:nvPr>
-        </p:nvSpPr>
-        <p:spPr/>
-        <p:txBody>
-          <a:bodyPr/>
-          <a:lstStyle/>
-          <a:p>
-            <a:r>
-              <a:rPr lang="en-US" dirty="0" smtClean="0"/>
-              <a:t>What we’re doing Wrong</a:t>
-            </a:r>
-            <a:endParaRPr lang="en-US" dirty="0"/>
-          </a:p>
-        </p:txBody>
-      </p:sp>
-      <p:sp>
-        <p:nvSpPr>
-          <p:cNvPr id="3" name="Content Placeholder 2"/>
-          <p:cNvSpPr>
-            <a:spLocks noGrp="1"/>
-          </p:cNvSpPr>
-          <p:nvPr>
-            <p:ph idx="1"/>
-          </p:nvPr>
-        </p:nvSpPr>
-        <p:spPr>
-          <a:xfrm>
-            <a:off x="457200" y="1371600"/>
-            <a:ext cx="8229600" cy="4800600"/>
-          </a:xfrm>
-        </p:spPr>
-        <p:txBody>
-          <a:bodyPr/>
-          <a:lstStyle/>
-          <a:p>
-            <a:r>
-              <a:rPr lang="en-US" sz="1800" dirty="0" smtClean="0"/>
-              <a:t>Not Invented Here syndrome</a:t>
-            </a:r>
-          </a:p>
-          <a:p>
-            <a:r>
-              <a:rPr lang="en-US" sz="1800" dirty="0" smtClean="0"/>
-              <a:t>We’re </a:t>
-            </a:r>
-            <a:r>
-              <a:rPr lang="en-US" sz="1800" dirty="0" smtClean="0"/>
-              <a:t>Not </a:t>
-            </a:r>
-            <a:r>
-              <a:rPr lang="en-US" sz="1800" dirty="0" smtClean="0"/>
-              <a:t>Sharing </a:t>
-            </a:r>
-            <a:r>
-              <a:rPr lang="en-US" sz="1800" dirty="0" smtClean="0"/>
-              <a:t>Enough</a:t>
-            </a:r>
-            <a:r>
-              <a:rPr lang="en-US" sz="1800" dirty="0" smtClean="0"/>
-              <a:t>! (i.e. useless language/tool debates, service catalogs</a:t>
-            </a:r>
-            <a:r>
-              <a:rPr lang="en-US" sz="1800" dirty="0" smtClean="0"/>
-              <a:t>)</a:t>
-            </a:r>
-          </a:p>
-          <a:p>
-            <a:pPr lvl="1"/>
-            <a:r>
-              <a:rPr lang="en-US" sz="1800" dirty="0" smtClean="0"/>
-              <a:t>It’s not about the language or tool</a:t>
-            </a:r>
-          </a:p>
-          <a:p>
-            <a:pPr lvl="1"/>
-            <a:r>
-              <a:rPr lang="en-US" sz="1800" dirty="0" smtClean="0"/>
-              <a:t>It’s about usable, actionable Software Development Standards!</a:t>
-            </a:r>
-          </a:p>
-          <a:p>
-            <a:pPr lvl="1"/>
-            <a:r>
-              <a:rPr lang="en-US" sz="1800" dirty="0" smtClean="0"/>
-              <a:t>And documentation (LP)</a:t>
-            </a:r>
-          </a:p>
-          <a:p>
-            <a:pPr lvl="2"/>
-            <a:r>
-              <a:rPr lang="en-US" sz="1800" dirty="0" smtClean="0"/>
-              <a:t>Comments are NOT sufficient documentation</a:t>
-            </a:r>
-          </a:p>
-          <a:p>
-            <a:pPr lvl="2"/>
-            <a:r>
-              <a:rPr lang="en-US" sz="1800" dirty="0" smtClean="0"/>
-              <a:t>Test cases are NOT “executable” documentation</a:t>
-            </a:r>
-          </a:p>
-          <a:p>
-            <a:pPr lvl="2"/>
-            <a:r>
-              <a:rPr lang="en-US" sz="1800" dirty="0" smtClean="0"/>
-              <a:t>Need to know Why something was done, not How</a:t>
-            </a:r>
-          </a:p>
-          <a:p>
-            <a:pPr lvl="1"/>
-            <a:r>
-              <a:rPr lang="en-US" sz="1800" dirty="0" smtClean="0"/>
-              <a:t>And a Service Catalog</a:t>
-            </a:r>
-          </a:p>
-          <a:p>
-            <a:pPr lvl="1"/>
-            <a:r>
-              <a:rPr lang="en-US" sz="1800" dirty="0" smtClean="0"/>
-              <a:t>Using well-known APIs (</a:t>
-            </a:r>
-            <a:r>
-              <a:rPr lang="en-US" sz="1800" dirty="0" err="1" smtClean="0"/>
-              <a:t>RESTFul</a:t>
-            </a:r>
-            <a:r>
-              <a:rPr lang="en-US" sz="1800" dirty="0" smtClean="0"/>
-              <a:t>, </a:t>
-            </a:r>
-            <a:r>
-              <a:rPr lang="en-US" sz="1800" dirty="0" err="1" smtClean="0"/>
-              <a:t>OAuth</a:t>
-            </a:r>
-            <a:r>
-              <a:rPr lang="en-US" sz="1800" dirty="0" smtClean="0"/>
-              <a:t>, etc.)</a:t>
-            </a:r>
-            <a:endParaRPr lang="en-US" sz="1800" dirty="0" smtClean="0"/>
-          </a:p>
-          <a:p>
-            <a:pPr marL="0" indent="0">
-              <a:buNone/>
-            </a:pPr>
-            <a:r>
-              <a:rPr lang="en-US" sz="1800" dirty="0" smtClean="0"/>
-              <a:t>=  We are still working on the balance between central and departmental services</a:t>
-            </a:r>
-          </a:p>
-          <a:p>
-            <a:pPr marL="0" indent="0">
-              <a:buNone/>
-            </a:pPr>
-            <a:r>
-              <a:rPr lang="en-US" sz="1800" dirty="0" smtClean="0"/>
-              <a:t>=  Better Collaboration</a:t>
-            </a:r>
-            <a:endParaRPr lang="en-US" sz="1800" dirty="0" smtClean="0"/>
-          </a:p>
-        </p:txBody>
-      </p:sp>
-    </p:spTree>
-    <p:extLst>
-      <p:ext uri="{BB962C8B-B14F-4D97-AF65-F5344CB8AC3E}">
-        <p14:creationId xmlns:p14="http://schemas.microsoft.com/office/powerpoint/2010/main" val="1730826855"/>
-      </p:ext>
-    </p:extLst>
-  </p:cSld>
-  <p:clrMapOvr>
-    <a:masterClrMapping/>
-  </p:clrMapOvr>
-</p:sld>
-</file>
-
-<file path=ppt/slides/slide12.xml><?xml version="1.0" encoding="utf-8"?>
 <p:sld xmlns:a="http://schemas.openxmlformats.org/drawingml/2006/main" xmlns:r="http://schemas.openxmlformats.org/officeDocument/2006/relationships" xmlns:p="http://schemas.openxmlformats.org/presentationml/2006/main">
   <p:cSld>
     <p:bg>
@@ -5166,18 +4940,6 @@
           <a:bodyPr/>
           <a:lstStyle/>
           <a:p>
-            <a:r>
-              <a:rPr lang="en-US" dirty="0" smtClean="0"/>
-              <a:t>Online Pre-Purchasing in </a:t>
-            </a:r>
-            <a:r>
-              <a:rPr lang="en-US" dirty="0" smtClean="0"/>
-              <a:t>7 </a:t>
-            </a:r>
-            <a:r>
-              <a:rPr lang="en-US" dirty="0" smtClean="0"/>
-              <a:t>months</a:t>
-            </a:r>
             <a:endParaRPr lang="en-US" dirty="0"/>
           </a:p>
         </p:txBody>
@@ -5199,24 +4961,39 @@
           <a:p>
             <a:r>
               <a:rPr lang="en-US" dirty="0" smtClean="0"/>
-              <a:t>(Show pretty </a:t>
-            </a:r>
-            <a:r>
-              <a:rPr lang="en-US" dirty="0" err="1" smtClean="0"/>
-              <a:t>graphcs</a:t>
-            </a:r>
+              <a:t>Culture</a:t>
+            </a:r>
+          </a:p>
+          <a:p>
             <a:r>
               <a:rPr lang="en-US" dirty="0" smtClean="0"/>
-              <a:t> on GitHub)</a:t>
-            </a:r>
-            <a:endParaRPr lang="en-US" dirty="0"/>
+              <a:t>Collaboration</a:t>
+            </a:r>
+          </a:p>
+          <a:p>
+            <a:r>
+              <a:rPr lang="en-US" dirty="0" smtClean="0"/>
+              <a:t>Process</a:t>
+            </a:r>
+          </a:p>
+          <a:p>
+            <a:r>
+              <a:rPr lang="en-US" dirty="0" smtClean="0"/>
+              <a:t>Cloud</a:t>
+            </a:r>
+          </a:p>
+          <a:p>
+            <a:r>
+              <a:rPr lang="en-US" dirty="0" smtClean="0"/>
+              <a:t>Services</a:t>
+            </a:r>
           </a:p>
         </p:txBody>
       </p:sp>
     </p:spTree>
     <p:extLst>
       <p:ext uri="{BB962C8B-B14F-4D97-AF65-F5344CB8AC3E}">
-        <p14:creationId xmlns:p14="http://schemas.microsoft.com/office/powerpoint/2010/main" val="959743254"/>
+        <p14:creationId xmlns:p14="http://schemas.microsoft.com/office/powerpoint/2010/main" val="2169765060"/>
       </p:ext>
     </p:extLst>
   </p:cSld>
@@ -5260,15 +5037,7 @@
           <a:p>
             <a:r>
               <a:rPr lang="en-US" dirty="0" smtClean="0"/>
-              <a:t>Online Pre-Purchasing in </a:t>
-            </a:r>
-            <a:r>
-              <a:rPr lang="en-US" dirty="0" smtClean="0"/>
-              <a:t>7 </a:t>
-            </a:r>
-            <a:r>
-              <a:rPr lang="en-US" dirty="0" smtClean="0"/>
-              <a:t>months</a:t>
+              <a:t>Culture</a:t>
             </a:r>
             <a:endParaRPr lang="en-US" dirty="0"/>
           </a:p>
@@ -5284,94 +5053,112 @@
             <p:ph idx="1"/>
           </p:nvPr>
         </p:nvSpPr>
-        <p:spPr/>
+        <p:spPr>
+          <a:xfrm>
+            <a:off x="457200" y="1371600"/>
+            <a:ext cx="8229600" cy="4800600"/>
+          </a:xfrm>
+        </p:spPr>
         <p:txBody>
           <a:bodyPr/>
           <a:lstStyle/>
           <a:p>
-            <a:r>
-              <a:rPr lang="en-US" sz="2400" dirty="0" smtClean="0"/>
-              <a:t>Agile development using </a:t>
-            </a:r>
-            <a:r>
-              <a:rPr lang="en-US" sz="2400" dirty="0" err="1" smtClean="0"/>
-              <a:t>Trello</a:t>
-            </a:r>
-            <a:r>
-              <a:rPr lang="en-US" sz="2400" dirty="0" smtClean="0"/>
-              <a:t> for user stories, GitHub for source code management/collaboration, and TeamCity for Continuous Integration (and eventually, deployment!)</a:t>
-            </a:r>
-          </a:p>
-          <a:p>
-            <a:r>
-              <a:rPr lang="en-US" sz="2400" dirty="0" smtClean="0"/>
-              <a:t>Battle-tested architecture using JavaScript front end (</a:t>
-            </a:r>
-            <a:r>
-              <a:rPr lang="en-US" sz="2400" dirty="0" err="1" smtClean="0"/>
-              <a:t>jQuery</a:t>
-            </a:r>
-            <a:r>
-              <a:rPr lang="en-US" sz="2400" dirty="0" smtClean="0"/>
-              <a:t>, knockout,) UCDArch (MVC, </a:t>
-            </a:r>
-            <a:r>
-              <a:rPr lang="en-US" sz="2400" dirty="0" err="1" smtClean="0"/>
-              <a:t>Nhibernate</a:t>
-            </a:r>
-            <a:r>
-              <a:rPr lang="en-US" sz="2400" dirty="0" smtClean="0"/>
-              <a:t>, CAS, </a:t>
-            </a:r>
-            <a:r>
-              <a:rPr lang="en-US" sz="2400" dirty="0" err="1" smtClean="0"/>
-              <a:t>etc</a:t>
-            </a:r>
-            <a:r>
-              <a:rPr lang="en-US" sz="2400" dirty="0" smtClean="0"/>
-              <a:t>) middle layer, SQL server backend, SOAP APIs </a:t>
-            </a:r>
-          </a:p>
-          <a:p>
-            <a:r>
-              <a:rPr lang="en-US" sz="2400" dirty="0" smtClean="0"/>
-              <a:t>Cloud infrastructure using </a:t>
-            </a:r>
-            <a:r>
-              <a:rPr lang="en-US" sz="2400" dirty="0" err="1" smtClean="0"/>
-              <a:t>Ganeti</a:t>
-            </a:r>
-            <a:r>
-              <a:rPr lang="en-US" sz="2400" dirty="0" smtClean="0"/>
-              <a:t>, managed by CSE (Bill </a:t>
-            </a:r>
-            <a:r>
-              <a:rPr lang="en-US" sz="2400" dirty="0" err="1" smtClean="0"/>
-              <a:t>Broadley</a:t>
-            </a:r>
-            <a:r>
-              <a:rPr lang="en-US" sz="2400" dirty="0" smtClean="0"/>
-              <a:t>) and running in the </a:t>
-            </a:r>
-            <a:r>
-              <a:rPr lang="en-US" sz="2400" dirty="0" err="1" smtClean="0"/>
-              <a:t>DataCenter</a:t>
-            </a:r>
-            <a:endParaRPr lang="en-US" sz="2400" dirty="0" smtClean="0"/>
-          </a:p>
-          <a:p>
-            <a:r>
-              <a:rPr lang="en-US" sz="2400" dirty="0" smtClean="0"/>
-              <a:t>UserVoice for feedback</a:t>
-            </a:r>
-            <a:endParaRPr lang="en-US" sz="2400" dirty="0"/>
+            <a:pPr marL="0" indent="0">
+              <a:buNone/>
+            </a:pPr>
+            <a:r>
+              <a:rPr lang="en-US" sz="1600" dirty="0" smtClean="0"/>
+              <a:t>We are in a research institution whose output is academic publications – and yet, we do not apply the same processes of peer-review, independent verification, and publication to our software.</a:t>
+            </a:r>
+          </a:p>
+          <a:p>
+            <a:pPr marL="0" indent="0">
+              <a:buNone/>
+            </a:pPr>
+            <a:r>
+              <a:rPr lang="en-US" sz="1600" dirty="0" smtClean="0"/>
+              <a:t>We don’t even fully consult with the intended users of our software before we design it!</a:t>
+            </a:r>
+          </a:p>
+          <a:p>
+            <a:pPr marL="0" indent="0">
+              <a:buNone/>
+            </a:pPr>
+            <a:r>
+              <a:rPr lang="en-US" sz="1600" dirty="0" smtClean="0"/>
+              <a:t>And we rarely get their input while we’re writing it!</a:t>
+            </a:r>
+          </a:p>
+          <a:p>
+            <a:r>
+              <a:rPr lang="en-US" sz="1600" dirty="0" smtClean="0"/>
+              <a:t>Not </a:t>
+            </a:r>
+            <a:r>
+              <a:rPr lang="en-US" sz="1600" dirty="0" smtClean="0"/>
+              <a:t>Invented Here </a:t>
+            </a:r>
+            <a:r>
+              <a:rPr lang="en-US" sz="1600" dirty="0" smtClean="0"/>
+              <a:t>syndrome</a:t>
+            </a:r>
+          </a:p>
+          <a:p>
+            <a:r>
+              <a:rPr lang="en-US" sz="1600" dirty="0" smtClean="0"/>
+              <a:t>Who fixes problems?</a:t>
+            </a:r>
+          </a:p>
+          <a:p>
+            <a:r>
+              <a:rPr lang="en-US" sz="1600" dirty="0" smtClean="0"/>
+              <a:t>(blame game chart)</a:t>
+            </a:r>
+            <a:endParaRPr lang="en-US" sz="1600" dirty="0"/>
+          </a:p>
+          <a:p>
+            <a:endParaRPr lang="en-US" sz="1600" dirty="0" smtClean="0"/>
+          </a:p>
+          <a:p>
+            <a:endParaRPr lang="en-US" sz="1600" dirty="0"/>
+          </a:p>
+          <a:p>
+            <a:endParaRPr lang="en-US" sz="1600" dirty="0" smtClean="0"/>
+          </a:p>
+          <a:p>
+            <a:endParaRPr lang="en-US" sz="1600" dirty="0"/>
+          </a:p>
+          <a:p>
+            <a:endParaRPr lang="en-US" sz="1600" dirty="0" smtClean="0"/>
+          </a:p>
+          <a:p>
+            <a:pPr marL="0" indent="0">
+              <a:buNone/>
+            </a:pPr>
+            <a:r>
+              <a:rPr lang="en-US" sz="1600" dirty="0" smtClean="0"/>
+              <a:t>=  </a:t>
+            </a:r>
+            <a:r>
+              <a:rPr lang="en-US" sz="1600" dirty="0" smtClean="0"/>
+              <a:t>We are still working on the balance between central and departmental services</a:t>
+            </a:r>
+          </a:p>
+          <a:p>
+            <a:pPr marL="0" indent="0">
+              <a:buNone/>
+            </a:pPr>
+            <a:r>
+              <a:rPr lang="en-US" sz="1600" dirty="0" smtClean="0"/>
+              <a:t>=  Better Collaboration</a:t>
+            </a:r>
           </a:p>
         </p:txBody>
       </p:sp>
     </p:spTree>
     <p:extLst>
       <p:ext uri="{BB962C8B-B14F-4D97-AF65-F5344CB8AC3E}">
-        <p14:creationId xmlns:p14="http://schemas.microsoft.com/office/powerpoint/2010/main" val="4251429537"/>
+        <p14:creationId xmlns:p14="http://schemas.microsoft.com/office/powerpoint/2010/main" val="1730826855"/>
       </p:ext>
     </p:extLst>
   </p:cSld>
@@ -5415,7 +5202,7 @@
           <a:p>
             <a:r>
               <a:rPr lang="en-US" dirty="0" smtClean="0"/>
-              <a:t>What we’re doing Right</a:t>
+              <a:t>Bug Fix costs</a:t>
             </a:r>
             <a:endParaRPr lang="en-US" dirty="0"/>
           </a:p>
@@ -5436,62 +5223,59 @@
           <a:bodyPr/>
           <a:lstStyle/>
           <a:p>
-            <a:pPr marL="514350" indent="-514350">
-              <a:buFont typeface="+mj-lt"/>
-              <a:buAutoNum type="arabicPeriod"/>
-            </a:pPr>
-            <a:r>
-              <a:rPr lang="en-US" sz="2400" dirty="0" smtClean="0"/>
-              <a:t>We are starting to listen to the demands of our customers – the “virtuous feedback loop”</a:t>
-            </a:r>
-          </a:p>
-          <a:p>
-            <a:pPr marL="514350" indent="-514350">
-              <a:buFont typeface="+mj-lt"/>
-              <a:buAutoNum type="arabicPeriod"/>
-            </a:pPr>
-            <a:r>
-              <a:rPr lang="en-US" sz="2400" dirty="0" smtClean="0"/>
-              <a:t>We are starting to leverage the power of the web</a:t>
-            </a:r>
-          </a:p>
-          <a:p>
-            <a:pPr marL="514350" indent="-514350">
-              <a:buFont typeface="+mj-lt"/>
-              <a:buAutoNum type="arabicPeriod"/>
-            </a:pPr>
-            <a:r>
-              <a:rPr lang="en-US" sz="2400" dirty="0" smtClean="0"/>
-              <a:t>We are starting to work together</a:t>
-            </a:r>
-          </a:p>
-          <a:p>
-            <a:pPr marL="514350" indent="-514350">
-              <a:buFont typeface="+mj-lt"/>
-              <a:buAutoNum type="arabicPeriod"/>
-            </a:pPr>
-            <a:r>
-              <a:rPr lang="en-US" sz="2400" dirty="0" smtClean="0"/>
-              <a:t>We are starting to use known/good software engineering principles</a:t>
-            </a:r>
-          </a:p>
-          <a:p>
-            <a:pPr marL="514350" indent="-514350">
-              <a:buFont typeface="+mj-lt"/>
-              <a:buAutoNum type="arabicPeriod"/>
-            </a:pPr>
-            <a:r>
-              <a:rPr lang="en-US" sz="2400" dirty="0" smtClean="0"/>
-              <a:t>“Central” systems are starting to understand that they provide consumable services to a wide range of applications and end users, and that they need to be flexible (= APIs and documentation)</a:t>
-            </a:r>
-            <a:endParaRPr lang="en-US" sz="2400" dirty="0"/>
+            <a:r>
+              <a:rPr lang="en-US" dirty="0" smtClean="0"/>
+              <a:t>The longer a bug sits, the harder it is to fix*</a:t>
+            </a:r>
+          </a:p>
+          <a:p>
+            <a:pPr lvl="1"/>
+            <a:r>
+              <a:rPr lang="en-US" dirty="0" smtClean="0"/>
+              <a:t>Compiler errors trivial</a:t>
+            </a:r>
+          </a:p>
+          <a:p>
+            <a:pPr lvl="1"/>
+            <a:r>
+              <a:rPr lang="en-US" dirty="0" smtClean="0"/>
+              <a:t>A few days ago easier</a:t>
+            </a:r>
+          </a:p>
+          <a:p>
+            <a:pPr lvl="1"/>
+            <a:r>
+              <a:rPr lang="en-US" dirty="0" smtClean="0"/>
+              <a:t>Months ago???</a:t>
+            </a:r>
+          </a:p>
+          <a:p>
+            <a:r>
+              <a:rPr lang="en-US" dirty="0" smtClean="0"/>
+              <a:t>The same applies to designing the application to begin with</a:t>
+            </a:r>
+          </a:p>
+          <a:p>
+            <a:r>
+              <a:rPr lang="en-US" dirty="0" smtClean="0">
+                <a:hlinkClick r:id="rId2"/>
+              </a:rPr>
+              <a:t>http</a:t>
+            </a:r>
+            <a:r>
+              <a:rPr lang="en-US" dirty="0">
+                <a:hlinkClick r:id="rId2"/>
+              </a:rPr>
+              <a:t>://www.joelonsoftware.com/articles/fog0000000043.html</a:t>
+            </a:r>
+            <a:endParaRPr lang="en-US" dirty="0"/>
           </a:p>
         </p:txBody>
       </p:sp>
     </p:spTree>
     <p:extLst>
       <p:ext uri="{BB962C8B-B14F-4D97-AF65-F5344CB8AC3E}">
-        <p14:creationId xmlns:p14="http://schemas.microsoft.com/office/powerpoint/2010/main" val="4216588563"/>
+        <p14:creationId xmlns:p14="http://schemas.microsoft.com/office/powerpoint/2010/main" val="162791620"/>
       </p:ext>
     </p:extLst>
   </p:cSld>
@@ -5535,7 +5319,7 @@
           <a:p>
             <a:r>
               <a:rPr lang="en-US" dirty="0" smtClean="0"/>
-              <a:t>What we’re doing Right</a:t>
+              <a:t>Collaboration</a:t>
             </a:r>
             <a:endParaRPr lang="en-US" dirty="0"/>
           </a:p>
@@ -5556,146 +5340,109 @@
           <a:bodyPr/>
           <a:lstStyle/>
           <a:p>
-            <a:pPr marL="514350" indent="-514350">
-              <a:buFont typeface="+mj-lt"/>
-              <a:buAutoNum type="arabicPeriod"/>
+            <a:pPr marL="342900" lvl="1" indent="-342900">
+              <a:buFontTx/>
+              <a:buChar char="•"/>
             </a:pPr>
             <a:r>
-              <a:rPr lang="en-US" sz="2400" dirty="0" smtClean="0"/>
-              <a:t>Agile development, Pre-Purchasing Steering Committee, UserVoice</a:t>
-            </a:r>
-          </a:p>
-          <a:p>
-            <a:pPr marL="514350" indent="-514350">
-              <a:buFont typeface="+mj-lt"/>
-              <a:buAutoNum type="arabicPeriod"/>
+              <a:rPr lang="en-US" dirty="0" smtClean="0"/>
+              <a:t>Get </a:t>
+            </a:r>
+            <a:r>
+              <a:rPr lang="en-US" dirty="0"/>
+              <a:t>Programmers to collaborate by project, not reporting </a:t>
+            </a:r>
+            <a:r>
+              <a:rPr lang="en-US" dirty="0" smtClean="0"/>
+              <a:t>relationship</a:t>
+            </a:r>
+          </a:p>
+          <a:p>
+            <a:r>
+              <a:rPr lang="en-US" sz="1600" dirty="0"/>
+              <a:t>We’re Not Sharing Enough! (i.e. useless language/tool debates, service catalogs)</a:t>
+            </a:r>
+          </a:p>
+          <a:p>
+            <a:pPr lvl="1"/>
+            <a:r>
+              <a:rPr lang="en-US" sz="1600" dirty="0"/>
+              <a:t>It’s not about the language or tool</a:t>
+            </a:r>
+          </a:p>
+          <a:p>
+            <a:pPr lvl="1"/>
+            <a:r>
+              <a:rPr lang="en-US" sz="1600" dirty="0"/>
+              <a:t>It’s about usable, actionable Software Development Standards!</a:t>
+            </a:r>
+          </a:p>
+          <a:p>
+            <a:pPr lvl="1"/>
+            <a:r>
+              <a:rPr lang="en-US" sz="1600" dirty="0"/>
+              <a:t>And documentation (LP)</a:t>
+            </a:r>
+          </a:p>
+          <a:p>
+            <a:pPr lvl="2"/>
+            <a:r>
+              <a:rPr lang="en-US" sz="1600" dirty="0"/>
+              <a:t>Comments are NOT sufficient documentation</a:t>
+            </a:r>
+          </a:p>
+          <a:p>
+            <a:pPr lvl="2"/>
+            <a:r>
+              <a:rPr lang="en-US" sz="1600" dirty="0"/>
+              <a:t>Test cases are NOT “executable” documentation</a:t>
+            </a:r>
+          </a:p>
+          <a:p>
+            <a:pPr lvl="2"/>
+            <a:r>
+              <a:rPr lang="en-US" sz="1600" dirty="0"/>
+              <a:t>Need to know Why something was done, not How</a:t>
+            </a:r>
+          </a:p>
+          <a:p>
+            <a:pPr lvl="1"/>
+            <a:r>
+              <a:rPr lang="en-US" sz="1600" dirty="0"/>
+              <a:t>And a Service Catalog</a:t>
+            </a:r>
+          </a:p>
+          <a:p>
+            <a:pPr lvl="1"/>
+            <a:r>
+              <a:rPr lang="en-US" sz="1600" dirty="0"/>
+              <a:t>Using well-known APIs (</a:t>
+            </a:r>
+            <a:r>
+              <a:rPr lang="en-US" sz="1600" dirty="0" err="1"/>
+              <a:t>RESTFul</a:t>
+            </a:r>
+            <a:r>
+              <a:rPr lang="en-US" sz="1600" dirty="0"/>
+              <a:t>, </a:t>
+            </a:r>
+            <a:r>
+              <a:rPr lang="en-US" sz="1600" dirty="0" err="1"/>
+              <a:t>OAuth</a:t>
+            </a:r>
+            <a:r>
+              <a:rPr lang="en-US" sz="1600" dirty="0"/>
+              <a:t>, etc.)</a:t>
+            </a:r>
+          </a:p>
+          <a:p>
+            <a:pPr marL="342900" lvl="1" indent="-342900">
+              <a:buFontTx/>
+              <a:buChar char="•"/>
             </a:pPr>
-            <a:r>
-              <a:rPr lang="en-US" sz="2400" dirty="0" smtClean="0"/>
-              <a:t>HTML5, CSS, </a:t>
-            </a:r>
-            <a:r>
-              <a:rPr lang="en-US" sz="2400" dirty="0" err="1" smtClean="0"/>
-              <a:t>Javascript</a:t>
-            </a:r>
-            <a:r>
-              <a:rPr lang="en-US" sz="2400" dirty="0" smtClean="0"/>
-              <a:t>, </a:t>
-            </a:r>
-            <a:r>
-              <a:rPr lang="en-US" sz="2400" dirty="0" err="1" smtClean="0"/>
-              <a:t>RESTful</a:t>
-            </a:r>
-            <a:r>
-              <a:rPr lang="en-US" sz="2400" dirty="0" smtClean="0"/>
-              <a:t> web services</a:t>
-            </a:r>
-          </a:p>
-          <a:p>
-            <a:pPr marL="514350" indent="-514350">
-              <a:buFont typeface="+mj-lt"/>
-              <a:buAutoNum type="arabicPeriod"/>
-            </a:pPr>
-            <a:r>
-              <a:rPr lang="en-US" sz="2400" dirty="0" smtClean="0"/>
-              <a:t>GitHub, code sprints, frequent meetings with clients (agile development)</a:t>
-            </a:r>
-          </a:p>
-          <a:p>
-            <a:pPr marL="514350" indent="-514350">
-              <a:buFont typeface="+mj-lt"/>
-              <a:buAutoNum type="arabicPeriod"/>
-            </a:pPr>
-            <a:r>
-              <a:rPr lang="en-US" sz="2400" dirty="0" smtClean="0"/>
-              <a:t>Solid architecture, code review, test-driven development, continuous integration, instrumentation</a:t>
-            </a:r>
-          </a:p>
-          <a:p>
-            <a:pPr marL="514350" indent="-514350">
-              <a:buFont typeface="+mj-lt"/>
-              <a:buAutoNum type="arabicPeriod"/>
-            </a:pPr>
-            <a:r>
-              <a:rPr lang="en-US" sz="2400" dirty="0" smtClean="0"/>
-              <a:t>Application Programming Interfaces, documentation</a:t>
-            </a:r>
-            <a:endParaRPr lang="en-US" sz="2400" dirty="0"/>
-          </a:p>
-        </p:txBody>
-      </p:sp>
-    </p:spTree>
-    <p:extLst>
-      <p:ext uri="{BB962C8B-B14F-4D97-AF65-F5344CB8AC3E}">
-        <p14:creationId xmlns:p14="http://schemas.microsoft.com/office/powerpoint/2010/main" val="1874216367"/>
-      </p:ext>
-    </p:extLst>
-  </p:cSld>
-  <p:clrMapOvr>
-    <a:masterClrMapping/>
-  </p:clrMapOvr>
-</p:sld>
-</file>
-
-<file path=ppt/slides/slide6.xml><?xml version="1.0" encoding="utf-8"?>
-<p:sld xmlns:a="http://schemas.openxmlformats.org/drawingml/2006/main" xmlns:r="http://schemas.openxmlformats.org/officeDocument/2006/relationships" xmlns:p="http://schemas.openxmlformats.org/presentationml/2006/main">
-  <p:cSld>
-    <p:spTree>
-      <p:nvGrpSpPr>
-        <p:cNvPr id="1" name=""/>
-        <p:cNvGrpSpPr/>
-        <p:nvPr/>
-      </p:nvGrpSpPr>
-      <p:grpSpPr>
-        <a:xfrm>
-          <a:off x="0" y="0"/>
-          <a:ext cx="0" cy="0"/>
-          <a:chOff x="0" y="0"/>
-          <a:chExt cx="0" cy="0"/>
-        </a:xfrm>
-      </p:grpSpPr>
-      <p:sp>
-        <p:nvSpPr>
-          <p:cNvPr id="2" name="Title 1"/>
-          <p:cNvSpPr>
-            <a:spLocks noGrp="1"/>
-          </p:cNvSpPr>
-          <p:nvPr>
-            <p:ph type="title"/>
-          </p:nvPr>
-        </p:nvSpPr>
-        <p:spPr/>
-        <p:txBody>
-          <a:bodyPr/>
-          <a:lstStyle/>
-          <a:p>
-            <a:r>
-              <a:rPr lang="en-US" dirty="0" smtClean="0"/>
-              <a:t>What we’re doing wrong</a:t>
-            </a:r>
-            <a:endParaRPr lang="en-US" dirty="0"/>
-          </a:p>
-        </p:txBody>
-      </p:sp>
-      <p:sp>
-        <p:nvSpPr>
-          <p:cNvPr id="3" name="Content Placeholder 2"/>
-          <p:cNvSpPr>
-            <a:spLocks noGrp="1"/>
-          </p:cNvSpPr>
-          <p:nvPr>
-            <p:ph idx="1"/>
-          </p:nvPr>
-        </p:nvSpPr>
-        <p:spPr/>
-        <p:txBody>
-          <a:bodyPr/>
-          <a:lstStyle/>
-          <a:p>
-            <a:r>
-              <a:rPr lang="en-US" dirty="0" smtClean="0"/>
-              <a:t>We think all Programmers are created equal</a:t>
-            </a:r>
+            <a:endParaRPr lang="en-US" dirty="0" smtClean="0"/>
+          </a:p>
+          <a:p>
             <a:endParaRPr lang="en-US" dirty="0"/>
           </a:p>
         </p:txBody>
@@ -5713,7 +5460,7 @@
 </p:sld>
 </file>
 
-<file path=ppt/slides/slide7.xml><?xml version="1.0" encoding="utf-8"?>
+<file path=ppt/slides/slide6.xml><?xml version="1.0" encoding="utf-8"?>
 <p:sld xmlns:a="http://schemas.openxmlformats.org/drawingml/2006/main" xmlns:r="http://schemas.openxmlformats.org/officeDocument/2006/relationships" xmlns:p="http://schemas.openxmlformats.org/presentationml/2006/main">
   <p:cSld>
     <p:spTree>
@@ -6037,6 +5784,223 @@
 </p:sld>
 </file>
 
+<file path=ppt/slides/slide7.xml><?xml version="1.0" encoding="utf-8"?>
+<p:sld xmlns:a="http://schemas.openxmlformats.org/drawingml/2006/main" xmlns:r="http://schemas.openxmlformats.org/officeDocument/2006/relationships" xmlns:p="http://schemas.openxmlformats.org/presentationml/2006/main">
+  <p:cSld>
+    <p:spTree>
+      <p:nvGrpSpPr>
+        <p:cNvPr id="1" name=""/>
+        <p:cNvGrpSpPr/>
+        <p:nvPr/>
+      </p:nvGrpSpPr>
+      <p:grpSpPr>
+        <a:xfrm>
+          <a:off x="0" y="0"/>
+          <a:ext cx="0" cy="0"/>
+          <a:chOff x="0" y="0"/>
+          <a:chExt cx="0" cy="0"/>
+        </a:xfrm>
+      </p:grpSpPr>
+      <p:sp>
+        <p:nvSpPr>
+          <p:cNvPr id="2" name="Title 1"/>
+          <p:cNvSpPr>
+            <a:spLocks noGrp="1"/>
+          </p:cNvSpPr>
+          <p:nvPr>
+            <p:ph type="title"/>
+          </p:nvPr>
+        </p:nvSpPr>
+        <p:spPr/>
+        <p:txBody>
+          <a:bodyPr/>
+          <a:lstStyle/>
+          <a:p>
+            <a:r>
+              <a:rPr lang="en-US" dirty="0" smtClean="0"/>
+              <a:t>Process</a:t>
+            </a:r>
+            <a:endParaRPr lang="en-US" dirty="0"/>
+          </a:p>
+        </p:txBody>
+      </p:sp>
+      <p:sp>
+        <p:nvSpPr>
+          <p:cNvPr id="3" name="Content Placeholder 2"/>
+          <p:cNvSpPr>
+            <a:spLocks noGrp="1"/>
+          </p:cNvSpPr>
+          <p:nvPr>
+            <p:ph idx="1"/>
+          </p:nvPr>
+        </p:nvSpPr>
+        <p:spPr/>
+        <p:txBody>
+          <a:bodyPr/>
+          <a:lstStyle/>
+          <a:p>
+            <a:pPr marL="0" indent="0">
+              <a:buNone/>
+            </a:pPr>
+            <a:r>
+              <a:rPr lang="en-US" sz="2800" dirty="0" smtClean="0"/>
+              <a:t>The Joel (</a:t>
+            </a:r>
+            <a:r>
+              <a:rPr lang="en-US" sz="2800" dirty="0" err="1" smtClean="0"/>
+              <a:t>Spolsky</a:t>
+            </a:r>
+            <a:r>
+              <a:rPr lang="en-US" sz="2800" dirty="0" smtClean="0"/>
+              <a:t>) Test:</a:t>
+            </a:r>
+          </a:p>
+          <a:p>
+            <a:pPr>
+              <a:buFont typeface="+mj-lt"/>
+              <a:buAutoNum type="arabicPeriod"/>
+            </a:pPr>
+            <a:r>
+              <a:rPr lang="en-US" sz="1800" dirty="0" smtClean="0"/>
+              <a:t>Do you use source control?</a:t>
+            </a:r>
+          </a:p>
+          <a:p>
+            <a:pPr>
+              <a:buFont typeface="+mj-lt"/>
+              <a:buAutoNum type="arabicPeriod"/>
+            </a:pPr>
+            <a:r>
+              <a:rPr lang="en-US" sz="1800" dirty="0" smtClean="0"/>
+              <a:t>Can you make a build in one step?</a:t>
+            </a:r>
+          </a:p>
+          <a:p>
+            <a:pPr>
+              <a:buFont typeface="+mj-lt"/>
+              <a:buAutoNum type="arabicPeriod"/>
+            </a:pPr>
+            <a:r>
+              <a:rPr lang="en-US" sz="1800" dirty="0" smtClean="0"/>
+              <a:t>Do you make daily builds?</a:t>
+            </a:r>
+          </a:p>
+          <a:p>
+            <a:pPr>
+              <a:buFont typeface="+mj-lt"/>
+              <a:buAutoNum type="arabicPeriod"/>
+            </a:pPr>
+            <a:r>
+              <a:rPr lang="en-US" sz="1800" dirty="0" smtClean="0"/>
+              <a:t>Do you have a bug database?</a:t>
+            </a:r>
+          </a:p>
+          <a:p>
+            <a:pPr>
+              <a:buFont typeface="+mj-lt"/>
+              <a:buAutoNum type="arabicPeriod"/>
+            </a:pPr>
+            <a:r>
+              <a:rPr lang="en-US" sz="1800" dirty="0" smtClean="0"/>
+              <a:t>Do you fix bugs before writing new code</a:t>
+            </a:r>
+          </a:p>
+          <a:p>
+            <a:pPr>
+              <a:buFont typeface="+mj-lt"/>
+              <a:buAutoNum type="arabicPeriod"/>
+            </a:pPr>
+            <a:r>
+              <a:rPr lang="en-US" sz="1800" dirty="0" smtClean="0"/>
+              <a:t>Do you have an up-to-date schedule</a:t>
+            </a:r>
+          </a:p>
+          <a:p>
+            <a:pPr>
+              <a:buFont typeface="+mj-lt"/>
+              <a:buAutoNum type="arabicPeriod"/>
+            </a:pPr>
+            <a:r>
+              <a:rPr lang="en-US" sz="1800" dirty="0" smtClean="0"/>
+              <a:t>Do you have a spec?</a:t>
+            </a:r>
+          </a:p>
+          <a:p>
+            <a:pPr>
+              <a:buFont typeface="+mj-lt"/>
+              <a:buAutoNum type="arabicPeriod"/>
+            </a:pPr>
+            <a:r>
+              <a:rPr lang="en-US" sz="1800" dirty="0" smtClean="0"/>
+              <a:t>Do programmers have quiet working conditions?</a:t>
+            </a:r>
+          </a:p>
+          <a:p>
+            <a:pPr>
+              <a:buFont typeface="+mj-lt"/>
+              <a:buAutoNum type="arabicPeriod"/>
+            </a:pPr>
+            <a:r>
+              <a:rPr lang="en-US" sz="1800" dirty="0" smtClean="0"/>
+              <a:t>Do you use the best tools?</a:t>
+            </a:r>
+          </a:p>
+          <a:p>
+            <a:pPr>
+              <a:buFont typeface="+mj-lt"/>
+              <a:buAutoNum type="arabicPeriod"/>
+            </a:pPr>
+            <a:r>
+              <a:rPr lang="en-US" sz="1800" dirty="0" smtClean="0"/>
+              <a:t>Do you have testers?</a:t>
+            </a:r>
+          </a:p>
+          <a:p>
+            <a:pPr>
+              <a:buFont typeface="+mj-lt"/>
+              <a:buAutoNum type="arabicPeriod"/>
+            </a:pPr>
+            <a:r>
+              <a:rPr lang="en-US" sz="1800" dirty="0" smtClean="0"/>
+              <a:t>Do new candidates write code during interviews?</a:t>
+            </a:r>
+          </a:p>
+          <a:p>
+            <a:pPr>
+              <a:buFont typeface="+mj-lt"/>
+              <a:buAutoNum type="arabicPeriod"/>
+            </a:pPr>
+            <a:r>
+              <a:rPr lang="en-US" sz="1800" dirty="0" smtClean="0"/>
+              <a:t>Do you do hallway usability testing?</a:t>
+            </a:r>
+            <a:endParaRPr lang="en-US" sz="1800" dirty="0"/>
+          </a:p>
+          <a:p>
+            <a:pPr marL="342900" lvl="1" indent="-342900">
+              <a:buFontTx/>
+              <a:buChar char="•"/>
+            </a:pPr>
+            <a:endParaRPr lang="en-US" dirty="0" smtClean="0"/>
+          </a:p>
+          <a:p>
+            <a:endParaRPr lang="en-US" dirty="0"/>
+          </a:p>
+        </p:txBody>
+      </p:sp>
+    </p:spTree>
+    <p:extLst>
+      <p:ext uri="{BB962C8B-B14F-4D97-AF65-F5344CB8AC3E}">
+        <p14:creationId xmlns:p14="http://schemas.microsoft.com/office/powerpoint/2010/main" val="2015317016"/>
+      </p:ext>
+    </p:extLst>
+  </p:cSld>
+  <p:clrMapOvr>
+    <a:masterClrMapping/>
+  </p:clrMapOvr>
+</p:sld>
+</file>
+
 <file path=ppt/slides/slide8.xml><?xml version="1.0" encoding="utf-8"?>
 <p:sld xmlns:a="http://schemas.openxmlformats.org/drawingml/2006/main" xmlns:r="http://schemas.openxmlformats.org/officeDocument/2006/relationships" xmlns:p="http://schemas.openxmlformats.org/presentationml/2006/main">
   <p:cSld>
@@ -6056,29 +6020,80 @@
       </p:grpSpPr>
       <p:sp>
         <p:nvSpPr>
-          <p:cNvPr id="2" name="TextBox 1"/>
-          <p:cNvSpPr txBox="1"/>
-          <p:nvPr/>
-        </p:nvSpPr>
-        <p:spPr>
-          <a:xfrm>
-            <a:off x="2209800" y="2133600"/>
-            <a:ext cx="3095784" cy="369332"/>
-          </a:xfrm>
-          <a:prstGeom prst="rect">
-            <a:avLst/>
-          </a:prstGeom>
-          <a:noFill/>
-        </p:spPr>
-        <p:txBody>
-          <a:bodyPr wrap="none" rtlCol="0">
-            <a:spAutoFit/>
-          </a:bodyPr>
+          <p:cNvPr id="2" name="Title 1"/>
+          <p:cNvSpPr>
+            <a:spLocks noGrp="1"/>
+          </p:cNvSpPr>
+          <p:nvPr>
+            <p:ph type="title"/>
+          </p:nvPr>
+        </p:nvSpPr>
+        <p:spPr/>
+        <p:txBody>
+          <a:bodyPr/>
           <a:lstStyle/>
           <a:p>
             <a:r>
               <a:rPr lang="en-US" dirty="0" smtClean="0"/>
-              <a:t>Picture of Applications Stack</a:t>
+              <a:t>Cloud</a:t>
+            </a:r>
+            <a:endParaRPr lang="en-US" dirty="0"/>
+          </a:p>
+        </p:txBody>
+      </p:sp>
+      <p:sp>
+        <p:nvSpPr>
+          <p:cNvPr id="3" name="Content Placeholder 2"/>
+          <p:cNvSpPr>
+            <a:spLocks noGrp="1"/>
+          </p:cNvSpPr>
+          <p:nvPr>
+            <p:ph idx="1"/>
+          </p:nvPr>
+        </p:nvSpPr>
+        <p:spPr/>
+        <p:txBody>
+          <a:bodyPr/>
+          <a:lstStyle/>
+          <a:p>
+            <a:pPr marL="0" indent="0">
+              <a:buNone/>
+            </a:pPr>
+            <a:endParaRPr lang="en-US" dirty="0" smtClean="0"/>
+          </a:p>
+          <a:p>
+            <a:r>
+              <a:rPr lang="en-US" dirty="0" smtClean="0"/>
+              <a:t>Virtualization </a:t>
+            </a:r>
+            <a:r>
+              <a:rPr lang="en-US" dirty="0"/>
+              <a:t>≠ Cloud Services</a:t>
+            </a:r>
+          </a:p>
+          <a:p>
+            <a:pPr marL="0" indent="0">
+              <a:buNone/>
+            </a:pPr>
+            <a:r>
+              <a:rPr lang="en-US" dirty="0" smtClean="0"/>
+              <a:t>-&gt; </a:t>
+            </a:r>
+            <a:r>
+              <a:rPr lang="en-US" dirty="0" err="1" smtClean="0"/>
+              <a:t>DevOps</a:t>
+            </a:r>
+            <a:r>
+              <a:rPr lang="en-US" dirty="0" smtClean="0"/>
+              <a:t> </a:t>
+            </a:r>
+            <a:r>
+              <a:rPr lang="en-US" dirty="0"/>
+              <a:t>= ??? (a combination of the above</a:t>
+            </a:r>
+            <a:r>
+              <a:rPr lang="en-US" dirty="0" smtClean="0"/>
+              <a:t>)</a:t>
             </a:r>
             <a:endParaRPr lang="en-US" dirty="0"/>
           </a:p>
@@ -6087,7 +6102,7 @@
     </p:spTree>
     <p:extLst>
       <p:ext uri="{BB962C8B-B14F-4D97-AF65-F5344CB8AC3E}">
-        <p14:creationId xmlns:p14="http://schemas.microsoft.com/office/powerpoint/2010/main" val="3448030267"/>
+        <p14:creationId xmlns:p14="http://schemas.microsoft.com/office/powerpoint/2010/main" val="43568849"/>
       </p:ext>
     </p:extLst>
   </p:cSld>
@@ -6131,7 +6146,7 @@
           <a:p>
             <a:r>
               <a:rPr lang="en-US" dirty="0" smtClean="0"/>
-              <a:t>What we’re doing wrong</a:t>
+              <a:t>Services</a:t>
             </a:r>
             <a:endParaRPr lang="en-US" dirty="0"/>
           </a:p>
@@ -6153,42 +6168,100 @@
           <a:lstStyle/>
           <a:p>
             <a:r>
-              <a:rPr lang="en-US" dirty="0"/>
-              <a:t>Virtualization ≠ Cloud Services</a:t>
-            </a:r>
-          </a:p>
-          <a:p>
-            <a:pPr marL="0" indent="0">
-              <a:buNone/>
-            </a:pPr>
-            <a:r>
-              <a:rPr lang="en-US" dirty="0" smtClean="0"/>
-              <a:t>-&gt; </a:t>
-            </a:r>
-            <a:r>
-              <a:rPr lang="en-US" dirty="0" err="1" smtClean="0"/>
-              <a:t>DevOps</a:t>
-            </a:r>
-            <a:r>
-              <a:rPr lang="en-US" dirty="0" smtClean="0"/>
-              <a:t> </a:t>
-            </a:r>
-            <a:r>
-              <a:rPr lang="en-US" dirty="0"/>
-              <a:t>= ??? (a combination of the above</a:t>
-            </a:r>
-            <a:r>
-              <a:rPr lang="en-US" dirty="0" smtClean="0"/>
-              <a:t>)</a:t>
-            </a:r>
-            <a:endParaRPr lang="en-US" dirty="0"/>
+              <a:rPr lang="en-US" sz="2000" dirty="0" smtClean="0"/>
+              <a:t>Why do we buy cloud computing from Amazon, an online bookstore?</a:t>
+            </a:r>
+          </a:p>
+          <a:p>
+            <a:r>
+              <a:rPr lang="en-US" sz="2000" dirty="0" smtClean="0"/>
+              <a:t>Steve </a:t>
+            </a:r>
+            <a:r>
+              <a:rPr lang="en-US" sz="2000" dirty="0" err="1" smtClean="0"/>
+              <a:t>Yegge’s</a:t>
+            </a:r>
+            <a:r>
+              <a:rPr lang="en-US" sz="2000" dirty="0" smtClean="0"/>
+              <a:t> Google Platform* rant:</a:t>
+            </a:r>
+          </a:p>
+          <a:p>
+            <a:pPr lvl="1"/>
+            <a:r>
+              <a:rPr lang="en-US" sz="1600" dirty="0" smtClean="0"/>
+              <a:t>All teams expose their data and functionality through service interfaces</a:t>
+            </a:r>
+          </a:p>
+          <a:p>
+            <a:pPr lvl="1"/>
+            <a:r>
+              <a:rPr lang="en-US" sz="1600" dirty="0" smtClean="0"/>
+              <a:t>Teams must communicate with each other through these interfaces</a:t>
+            </a:r>
+          </a:p>
+          <a:p>
+            <a:pPr lvl="1"/>
+            <a:r>
+              <a:rPr lang="en-US" sz="1600" dirty="0" smtClean="0"/>
+              <a:t>There will be no other form of </a:t>
+            </a:r>
+            <a:r>
+              <a:rPr lang="en-US" sz="1600" dirty="0" err="1" smtClean="0"/>
+              <a:t>interprocess</a:t>
+            </a:r>
+            <a:r>
+              <a:rPr lang="en-US" sz="1600" dirty="0" smtClean="0"/>
+              <a:t> communication allowed: no direct linking, no direct reads of another team’s data store, no shared-memory model, no back doors whatsoever</a:t>
+            </a:r>
+          </a:p>
+          <a:p>
+            <a:pPr lvl="1"/>
+            <a:r>
+              <a:rPr lang="en-US" sz="1600" dirty="0" smtClean="0"/>
+              <a:t>It doesn’t matter what technology is used</a:t>
+            </a:r>
+          </a:p>
+          <a:p>
+            <a:pPr lvl="1"/>
+            <a:r>
+              <a:rPr lang="en-US" sz="1600" dirty="0" smtClean="0"/>
+              <a:t>All service interfaces, without exception, must be designed from the ground up to be </a:t>
+            </a:r>
+            <a:r>
+              <a:rPr lang="en-US" sz="1600" dirty="0" err="1" smtClean="0"/>
+              <a:t>externalizable</a:t>
+            </a:r>
+            <a:r>
+              <a:rPr lang="en-US" sz="1600" dirty="0" smtClean="0"/>
+              <a:t>.</a:t>
+            </a:r>
+          </a:p>
+          <a:p>
+            <a:pPr lvl="1"/>
+            <a:r>
+              <a:rPr lang="en-US" sz="1600" dirty="0" smtClean="0"/>
+              <a:t>Anyone who doesn’t do this will be fired</a:t>
+            </a:r>
+          </a:p>
+          <a:p>
+            <a:endParaRPr lang="en-US" sz="2000" dirty="0" smtClean="0"/>
+          </a:p>
+          <a:p>
+            <a:r>
+              <a:rPr lang="en-US" sz="2000" dirty="0">
+                <a:hlinkClick r:id="rId2"/>
+              </a:rPr>
+              <a:t>http://news.ycombinator.com/item?id=3101876</a:t>
+            </a:r>
+            <a:endParaRPr lang="en-US" sz="2000" dirty="0"/>
           </a:p>
         </p:txBody>
       </p:sp>
     </p:spTree>
     <p:extLst>
       <p:ext uri="{BB962C8B-B14F-4D97-AF65-F5344CB8AC3E}">
-        <p14:creationId xmlns:p14="http://schemas.microsoft.com/office/powerpoint/2010/main" val="43568849"/>
+        <p14:creationId xmlns:p14="http://schemas.microsoft.com/office/powerpoint/2010/main" val="2660073888"/>
       </p:ext>
     </p:extLst>
   </p:cSld>

</xml_diff>

<commit_message>
Finished TIF Ignite presentation
</commit_message>
<xml_diff>
--- a/TIF-Ignite.pptx
+++ b/TIF-Ignite.pptx
@@ -5,7 +5,7 @@
     <p:sldMasterId id="2147483672" r:id="rId1"/>
   </p:sldMasterIdLst>
   <p:notesMasterIdLst>
-    <p:notesMasterId r:id="rId13"/>
+    <p:notesMasterId r:id="rId20"/>
   </p:notesMasterIdLst>
   <p:sldIdLst>
     <p:sldId id="257" r:id="rId2"/>
@@ -16,9 +16,16 @@
     <p:sldId id="262" r:id="rId7"/>
     <p:sldId id="273" r:id="rId8"/>
     <p:sldId id="264" r:id="rId9"/>
-    <p:sldId id="263" r:id="rId10"/>
-    <p:sldId id="270" r:id="rId11"/>
-    <p:sldId id="266" r:id="rId12"/>
+    <p:sldId id="275" r:id="rId10"/>
+    <p:sldId id="276" r:id="rId11"/>
+    <p:sldId id="278" r:id="rId12"/>
+    <p:sldId id="281" r:id="rId13"/>
+    <p:sldId id="277" r:id="rId14"/>
+    <p:sldId id="279" r:id="rId15"/>
+    <p:sldId id="280" r:id="rId16"/>
+    <p:sldId id="263" r:id="rId17"/>
+    <p:sldId id="270" r:id="rId18"/>
+    <p:sldId id="266" r:id="rId19"/>
   </p:sldIdLst>
   <p:sldSz cx="9144000" cy="6858000" type="screen4x3"/>
   <p:notesSz cx="6858000" cy="9144000"/>
@@ -202,7 +209,7 @@
           <a:p>
             <a:fld id="{3AF8D1B2-0A1C-4E95-B09A-497F170451A9}" type="datetimeFigureOut">
               <a:rPr lang="en-US" smtClean="0"/>
-              <a:t>3/27/2012</a:t>
+              <a:t>3/28/2012</a:t>
             </a:fld>
             <a:endParaRPr lang="en-US"/>
           </a:p>
@@ -4349,15 +4356,7 @@
                   <a:schemeClr val="bg1"/>
                 </a:solidFill>
               </a:rPr>
-              <a:t>Agile Software Development @ </a:t>
-            </a:r>
-            <a:r>
-              <a:rPr lang="en-US" dirty="0" smtClean="0">
-                <a:solidFill>
-                  <a:schemeClr val="bg1"/>
-                </a:solidFill>
-              </a:rPr>
-              <a:t>UC Davis</a:t>
+              <a:t>Agile Software Development @ UC Davis</a:t>
             </a:r>
           </a:p>
         </p:txBody>
@@ -4559,6 +4558,879 @@
           <a:p>
             <a:r>
               <a:rPr lang="en-US" dirty="0" smtClean="0"/>
+              <a:t>Cloud</a:t>
+            </a:r>
+            <a:endParaRPr lang="en-US" dirty="0"/>
+          </a:p>
+        </p:txBody>
+      </p:sp>
+      <p:pic>
+        <p:nvPicPr>
+          <p:cNvPr id="2051" name="Picture 3"/>
+          <p:cNvPicPr>
+            <a:picLocks noGrp="1" noChangeAspect="1" noChangeArrowheads="1"/>
+          </p:cNvPicPr>
+          <p:nvPr>
+            <p:ph idx="1"/>
+          </p:nvPr>
+        </p:nvPicPr>
+        <p:blipFill>
+          <a:blip r:embed="rId2">
+            <a:extLst>
+              <a:ext uri="{28A0092B-C50C-407E-A947-70E740481C1C}">
+                <a14:useLocalDpi xmlns:a14="http://schemas.microsoft.com/office/drawing/2010/main" val="0"/>
+              </a:ext>
+            </a:extLst>
+          </a:blip>
+          <a:srcRect/>
+          <a:stretch>
+            <a:fillRect/>
+          </a:stretch>
+        </p:blipFill>
+        <p:spPr bwMode="auto">
+          <a:xfrm>
+            <a:off x="1620601" y="1600200"/>
+            <a:ext cx="5902797" cy="4525963"/>
+          </a:xfrm>
+          <a:prstGeom prst="rect">
+            <a:avLst/>
+          </a:prstGeom>
+          <a:noFill/>
+          <a:ln>
+            <a:noFill/>
+          </a:ln>
+          <a:effectLst/>
+          <a:extLst>
+            <a:ext uri="{909E8E84-426E-40DD-AFC4-6F175D3DCCD1}">
+              <a14:hiddenFill xmlns:a14="http://schemas.microsoft.com/office/drawing/2010/main">
+                <a:solidFill>
+                  <a:schemeClr val="accent1"/>
+                </a:solidFill>
+              </a14:hiddenFill>
+            </a:ext>
+            <a:ext uri="{91240B29-F687-4F45-9708-019B960494DF}">
+              <a14:hiddenLine xmlns:a14="http://schemas.microsoft.com/office/drawing/2010/main" w="9525">
+                <a:solidFill>
+                  <a:schemeClr val="tx1"/>
+                </a:solidFill>
+                <a:miter lim="800000"/>
+                <a:headEnd/>
+                <a:tailEnd/>
+              </a14:hiddenLine>
+            </a:ext>
+            <a:ext uri="{AF507438-7753-43E0-B8FC-AC1667EBCBE1}">
+              <a14:hiddenEffects xmlns:a14="http://schemas.microsoft.com/office/drawing/2010/main">
+                <a:effectLst>
+                  <a:outerShdw dist="35921" dir="2700000" algn="ctr" rotWithShape="0">
+                    <a:schemeClr val="bg2"/>
+                  </a:outerShdw>
+                </a:effectLst>
+              </a14:hiddenEffects>
+            </a:ext>
+          </a:extLst>
+        </p:spPr>
+      </p:pic>
+    </p:spTree>
+    <p:extLst>
+      <p:ext uri="{BB962C8B-B14F-4D97-AF65-F5344CB8AC3E}">
+        <p14:creationId xmlns:p14="http://schemas.microsoft.com/office/powerpoint/2010/main" val="1353789509"/>
+      </p:ext>
+    </p:extLst>
+  </p:cSld>
+  <p:clrMapOvr>
+    <a:masterClrMapping/>
+  </p:clrMapOvr>
+</p:sld>
+</file>
+
+<file path=ppt/slides/slide11.xml><?xml version="1.0" encoding="utf-8"?>
+<p:sld xmlns:a="http://schemas.openxmlformats.org/drawingml/2006/main" xmlns:r="http://schemas.openxmlformats.org/officeDocument/2006/relationships" xmlns:p="http://schemas.openxmlformats.org/presentationml/2006/main">
+  <p:cSld>
+    <p:spTree>
+      <p:nvGrpSpPr>
+        <p:cNvPr id="1" name=""/>
+        <p:cNvGrpSpPr/>
+        <p:nvPr/>
+      </p:nvGrpSpPr>
+      <p:grpSpPr>
+        <a:xfrm>
+          <a:off x="0" y="0"/>
+          <a:ext cx="0" cy="0"/>
+          <a:chOff x="0" y="0"/>
+          <a:chExt cx="0" cy="0"/>
+        </a:xfrm>
+      </p:grpSpPr>
+      <p:sp>
+        <p:nvSpPr>
+          <p:cNvPr id="2" name="Title 1"/>
+          <p:cNvSpPr>
+            <a:spLocks noGrp="1"/>
+          </p:cNvSpPr>
+          <p:nvPr>
+            <p:ph type="title"/>
+          </p:nvPr>
+        </p:nvSpPr>
+        <p:spPr/>
+        <p:txBody>
+          <a:bodyPr/>
+          <a:lstStyle/>
+          <a:p>
+            <a:r>
+              <a:rPr lang="en-US" dirty="0" smtClean="0"/>
+              <a:t>Cloud</a:t>
+            </a:r>
+            <a:endParaRPr lang="en-US" dirty="0"/>
+          </a:p>
+        </p:txBody>
+      </p:sp>
+      <p:pic>
+        <p:nvPicPr>
+          <p:cNvPr id="3074" name="Picture 2"/>
+          <p:cNvPicPr>
+            <a:picLocks noGrp="1" noChangeAspect="1" noChangeArrowheads="1"/>
+          </p:cNvPicPr>
+          <p:nvPr>
+            <p:ph idx="1"/>
+          </p:nvPr>
+        </p:nvPicPr>
+        <p:blipFill>
+          <a:blip r:embed="rId2">
+            <a:extLst>
+              <a:ext uri="{28A0092B-C50C-407E-A947-70E740481C1C}">
+                <a14:useLocalDpi xmlns:a14="http://schemas.microsoft.com/office/drawing/2010/main" val="0"/>
+              </a:ext>
+            </a:extLst>
+          </a:blip>
+          <a:srcRect/>
+          <a:stretch>
+            <a:fillRect/>
+          </a:stretch>
+        </p:blipFill>
+        <p:spPr bwMode="auto">
+          <a:xfrm>
+            <a:off x="1620601" y="1600200"/>
+            <a:ext cx="5902797" cy="4525963"/>
+          </a:xfrm>
+          <a:prstGeom prst="rect">
+            <a:avLst/>
+          </a:prstGeom>
+          <a:noFill/>
+          <a:ln>
+            <a:noFill/>
+          </a:ln>
+          <a:effectLst/>
+          <a:extLst>
+            <a:ext uri="{909E8E84-426E-40DD-AFC4-6F175D3DCCD1}">
+              <a14:hiddenFill xmlns:a14="http://schemas.microsoft.com/office/drawing/2010/main">
+                <a:solidFill>
+                  <a:schemeClr val="accent1"/>
+                </a:solidFill>
+              </a14:hiddenFill>
+            </a:ext>
+            <a:ext uri="{91240B29-F687-4F45-9708-019B960494DF}">
+              <a14:hiddenLine xmlns:a14="http://schemas.microsoft.com/office/drawing/2010/main" w="9525">
+                <a:solidFill>
+                  <a:schemeClr val="tx1"/>
+                </a:solidFill>
+                <a:miter lim="800000"/>
+                <a:headEnd/>
+                <a:tailEnd/>
+              </a14:hiddenLine>
+            </a:ext>
+            <a:ext uri="{AF507438-7753-43E0-B8FC-AC1667EBCBE1}">
+              <a14:hiddenEffects xmlns:a14="http://schemas.microsoft.com/office/drawing/2010/main">
+                <a:effectLst>
+                  <a:outerShdw dist="35921" dir="2700000" algn="ctr" rotWithShape="0">
+                    <a:schemeClr val="bg2"/>
+                  </a:outerShdw>
+                </a:effectLst>
+              </a14:hiddenEffects>
+            </a:ext>
+          </a:extLst>
+        </p:spPr>
+      </p:pic>
+    </p:spTree>
+    <p:extLst>
+      <p:ext uri="{BB962C8B-B14F-4D97-AF65-F5344CB8AC3E}">
+        <p14:creationId xmlns:p14="http://schemas.microsoft.com/office/powerpoint/2010/main" val="771882916"/>
+      </p:ext>
+    </p:extLst>
+  </p:cSld>
+  <p:clrMapOvr>
+    <a:masterClrMapping/>
+  </p:clrMapOvr>
+</p:sld>
+</file>
+
+<file path=ppt/slides/slide12.xml><?xml version="1.0" encoding="utf-8"?>
+<p:sld xmlns:a="http://schemas.openxmlformats.org/drawingml/2006/main" xmlns:r="http://schemas.openxmlformats.org/officeDocument/2006/relationships" xmlns:p="http://schemas.openxmlformats.org/presentationml/2006/main">
+  <p:cSld>
+    <p:spTree>
+      <p:nvGrpSpPr>
+        <p:cNvPr id="1" name=""/>
+        <p:cNvGrpSpPr/>
+        <p:nvPr/>
+      </p:nvGrpSpPr>
+      <p:grpSpPr>
+        <a:xfrm>
+          <a:off x="0" y="0"/>
+          <a:ext cx="0" cy="0"/>
+          <a:chOff x="0" y="0"/>
+          <a:chExt cx="0" cy="0"/>
+        </a:xfrm>
+      </p:grpSpPr>
+      <p:sp>
+        <p:nvSpPr>
+          <p:cNvPr id="2" name="Title 1"/>
+          <p:cNvSpPr>
+            <a:spLocks noGrp="1"/>
+          </p:cNvSpPr>
+          <p:nvPr>
+            <p:ph type="title"/>
+          </p:nvPr>
+        </p:nvSpPr>
+        <p:spPr/>
+        <p:txBody>
+          <a:bodyPr/>
+          <a:lstStyle/>
+          <a:p>
+            <a:r>
+              <a:rPr lang="en-US" dirty="0" smtClean="0"/>
+              <a:t>Cloud</a:t>
+            </a:r>
+            <a:endParaRPr lang="en-US" dirty="0"/>
+          </a:p>
+        </p:txBody>
+      </p:sp>
+      <p:pic>
+        <p:nvPicPr>
+          <p:cNvPr id="4098" name="Picture 2"/>
+          <p:cNvPicPr>
+            <a:picLocks noGrp="1" noChangeAspect="1" noChangeArrowheads="1"/>
+          </p:cNvPicPr>
+          <p:nvPr>
+            <p:ph idx="1"/>
+          </p:nvPr>
+        </p:nvPicPr>
+        <p:blipFill>
+          <a:blip r:embed="rId2">
+            <a:extLst>
+              <a:ext uri="{28A0092B-C50C-407E-A947-70E740481C1C}">
+                <a14:useLocalDpi xmlns:a14="http://schemas.microsoft.com/office/drawing/2010/main" val="0"/>
+              </a:ext>
+            </a:extLst>
+          </a:blip>
+          <a:srcRect/>
+          <a:stretch>
+            <a:fillRect/>
+          </a:stretch>
+        </p:blipFill>
+        <p:spPr bwMode="auto">
+          <a:xfrm>
+            <a:off x="1620601" y="1600200"/>
+            <a:ext cx="5902797" cy="4525963"/>
+          </a:xfrm>
+          <a:prstGeom prst="rect">
+            <a:avLst/>
+          </a:prstGeom>
+          <a:noFill/>
+          <a:ln>
+            <a:noFill/>
+          </a:ln>
+          <a:effectLst/>
+          <a:extLst>
+            <a:ext uri="{909E8E84-426E-40DD-AFC4-6F175D3DCCD1}">
+              <a14:hiddenFill xmlns:a14="http://schemas.microsoft.com/office/drawing/2010/main">
+                <a:solidFill>
+                  <a:schemeClr val="accent1"/>
+                </a:solidFill>
+              </a14:hiddenFill>
+            </a:ext>
+            <a:ext uri="{91240B29-F687-4F45-9708-019B960494DF}">
+              <a14:hiddenLine xmlns:a14="http://schemas.microsoft.com/office/drawing/2010/main" w="9525">
+                <a:solidFill>
+                  <a:schemeClr val="tx1"/>
+                </a:solidFill>
+                <a:miter lim="800000"/>
+                <a:headEnd/>
+                <a:tailEnd/>
+              </a14:hiddenLine>
+            </a:ext>
+            <a:ext uri="{AF507438-7753-43E0-B8FC-AC1667EBCBE1}">
+              <a14:hiddenEffects xmlns:a14="http://schemas.microsoft.com/office/drawing/2010/main">
+                <a:effectLst>
+                  <a:outerShdw dist="35921" dir="2700000" algn="ctr" rotWithShape="0">
+                    <a:schemeClr val="bg2"/>
+                  </a:outerShdw>
+                </a:effectLst>
+              </a14:hiddenEffects>
+            </a:ext>
+          </a:extLst>
+        </p:spPr>
+      </p:pic>
+    </p:spTree>
+    <p:extLst>
+      <p:ext uri="{BB962C8B-B14F-4D97-AF65-F5344CB8AC3E}">
+        <p14:creationId xmlns:p14="http://schemas.microsoft.com/office/powerpoint/2010/main" val="2873304962"/>
+      </p:ext>
+    </p:extLst>
+  </p:cSld>
+  <p:clrMapOvr>
+    <a:masterClrMapping/>
+  </p:clrMapOvr>
+</p:sld>
+</file>
+
+<file path=ppt/slides/slide13.xml><?xml version="1.0" encoding="utf-8"?>
+<p:sld xmlns:a="http://schemas.openxmlformats.org/drawingml/2006/main" xmlns:r="http://schemas.openxmlformats.org/officeDocument/2006/relationships" xmlns:p="http://schemas.openxmlformats.org/presentationml/2006/main">
+  <p:cSld>
+    <p:spTree>
+      <p:nvGrpSpPr>
+        <p:cNvPr id="1" name=""/>
+        <p:cNvGrpSpPr/>
+        <p:nvPr/>
+      </p:nvGrpSpPr>
+      <p:grpSpPr>
+        <a:xfrm>
+          <a:off x="0" y="0"/>
+          <a:ext cx="0" cy="0"/>
+          <a:chOff x="0" y="0"/>
+          <a:chExt cx="0" cy="0"/>
+        </a:xfrm>
+      </p:grpSpPr>
+      <p:sp>
+        <p:nvSpPr>
+          <p:cNvPr id="2" name="Title 1"/>
+          <p:cNvSpPr>
+            <a:spLocks noGrp="1"/>
+          </p:cNvSpPr>
+          <p:nvPr>
+            <p:ph type="title"/>
+          </p:nvPr>
+        </p:nvSpPr>
+        <p:spPr/>
+        <p:txBody>
+          <a:bodyPr/>
+          <a:lstStyle/>
+          <a:p>
+            <a:r>
+              <a:rPr lang="en-US" dirty="0" smtClean="0"/>
+              <a:t>Cloud</a:t>
+            </a:r>
+            <a:endParaRPr lang="en-US" dirty="0"/>
+          </a:p>
+        </p:txBody>
+      </p:sp>
+      <p:pic>
+        <p:nvPicPr>
+          <p:cNvPr id="5122" name="Picture 2"/>
+          <p:cNvPicPr>
+            <a:picLocks noGrp="1" noChangeAspect="1" noChangeArrowheads="1"/>
+          </p:cNvPicPr>
+          <p:nvPr>
+            <p:ph idx="1"/>
+          </p:nvPr>
+        </p:nvPicPr>
+        <p:blipFill>
+          <a:blip r:embed="rId2">
+            <a:extLst>
+              <a:ext uri="{28A0092B-C50C-407E-A947-70E740481C1C}">
+                <a14:useLocalDpi xmlns:a14="http://schemas.microsoft.com/office/drawing/2010/main" val="0"/>
+              </a:ext>
+            </a:extLst>
+          </a:blip>
+          <a:srcRect/>
+          <a:stretch>
+            <a:fillRect/>
+          </a:stretch>
+        </p:blipFill>
+        <p:spPr bwMode="auto">
+          <a:xfrm>
+            <a:off x="1620601" y="1600200"/>
+            <a:ext cx="5902797" cy="4525963"/>
+          </a:xfrm>
+          <a:prstGeom prst="rect">
+            <a:avLst/>
+          </a:prstGeom>
+          <a:noFill/>
+          <a:ln>
+            <a:noFill/>
+          </a:ln>
+          <a:effectLst/>
+          <a:extLst>
+            <a:ext uri="{909E8E84-426E-40DD-AFC4-6F175D3DCCD1}">
+              <a14:hiddenFill xmlns:a14="http://schemas.microsoft.com/office/drawing/2010/main">
+                <a:solidFill>
+                  <a:schemeClr val="accent1"/>
+                </a:solidFill>
+              </a14:hiddenFill>
+            </a:ext>
+            <a:ext uri="{91240B29-F687-4F45-9708-019B960494DF}">
+              <a14:hiddenLine xmlns:a14="http://schemas.microsoft.com/office/drawing/2010/main" w="9525">
+                <a:solidFill>
+                  <a:schemeClr val="tx1"/>
+                </a:solidFill>
+                <a:miter lim="800000"/>
+                <a:headEnd/>
+                <a:tailEnd/>
+              </a14:hiddenLine>
+            </a:ext>
+            <a:ext uri="{AF507438-7753-43E0-B8FC-AC1667EBCBE1}">
+              <a14:hiddenEffects xmlns:a14="http://schemas.microsoft.com/office/drawing/2010/main">
+                <a:effectLst>
+                  <a:outerShdw dist="35921" dir="2700000" algn="ctr" rotWithShape="0">
+                    <a:schemeClr val="bg2"/>
+                  </a:outerShdw>
+                </a:effectLst>
+              </a14:hiddenEffects>
+            </a:ext>
+          </a:extLst>
+        </p:spPr>
+      </p:pic>
+    </p:spTree>
+    <p:extLst>
+      <p:ext uri="{BB962C8B-B14F-4D97-AF65-F5344CB8AC3E}">
+        <p14:creationId xmlns:p14="http://schemas.microsoft.com/office/powerpoint/2010/main" val="3968503409"/>
+      </p:ext>
+    </p:extLst>
+  </p:cSld>
+  <p:clrMapOvr>
+    <a:masterClrMapping/>
+  </p:clrMapOvr>
+</p:sld>
+</file>
+
+<file path=ppt/slides/slide14.xml><?xml version="1.0" encoding="utf-8"?>
+<p:sld xmlns:a="http://schemas.openxmlformats.org/drawingml/2006/main" xmlns:r="http://schemas.openxmlformats.org/officeDocument/2006/relationships" xmlns:p="http://schemas.openxmlformats.org/presentationml/2006/main">
+  <p:cSld>
+    <p:spTree>
+      <p:nvGrpSpPr>
+        <p:cNvPr id="1" name=""/>
+        <p:cNvGrpSpPr/>
+        <p:nvPr/>
+      </p:nvGrpSpPr>
+      <p:grpSpPr>
+        <a:xfrm>
+          <a:off x="0" y="0"/>
+          <a:ext cx="0" cy="0"/>
+          <a:chOff x="0" y="0"/>
+          <a:chExt cx="0" cy="0"/>
+        </a:xfrm>
+      </p:grpSpPr>
+      <p:sp>
+        <p:nvSpPr>
+          <p:cNvPr id="2" name="Title 1"/>
+          <p:cNvSpPr>
+            <a:spLocks noGrp="1"/>
+          </p:cNvSpPr>
+          <p:nvPr>
+            <p:ph type="title"/>
+          </p:nvPr>
+        </p:nvSpPr>
+        <p:spPr/>
+        <p:txBody>
+          <a:bodyPr/>
+          <a:lstStyle/>
+          <a:p>
+            <a:r>
+              <a:rPr lang="en-US" dirty="0" smtClean="0"/>
+              <a:t>Cloud</a:t>
+            </a:r>
+            <a:endParaRPr lang="en-US" dirty="0"/>
+          </a:p>
+        </p:txBody>
+      </p:sp>
+      <p:pic>
+        <p:nvPicPr>
+          <p:cNvPr id="6146" name="Picture 2"/>
+          <p:cNvPicPr>
+            <a:picLocks noGrp="1" noChangeAspect="1" noChangeArrowheads="1"/>
+          </p:cNvPicPr>
+          <p:nvPr>
+            <p:ph idx="1"/>
+          </p:nvPr>
+        </p:nvPicPr>
+        <p:blipFill>
+          <a:blip r:embed="rId2">
+            <a:extLst>
+              <a:ext uri="{28A0092B-C50C-407E-A947-70E740481C1C}">
+                <a14:useLocalDpi xmlns:a14="http://schemas.microsoft.com/office/drawing/2010/main" val="0"/>
+              </a:ext>
+            </a:extLst>
+          </a:blip>
+          <a:srcRect/>
+          <a:stretch>
+            <a:fillRect/>
+          </a:stretch>
+        </p:blipFill>
+        <p:spPr bwMode="auto">
+          <a:xfrm>
+            <a:off x="1620601" y="1600200"/>
+            <a:ext cx="5902797" cy="4525963"/>
+          </a:xfrm>
+          <a:prstGeom prst="rect">
+            <a:avLst/>
+          </a:prstGeom>
+          <a:noFill/>
+          <a:ln>
+            <a:noFill/>
+          </a:ln>
+          <a:effectLst/>
+          <a:extLst>
+            <a:ext uri="{909E8E84-426E-40DD-AFC4-6F175D3DCCD1}">
+              <a14:hiddenFill xmlns:a14="http://schemas.microsoft.com/office/drawing/2010/main">
+                <a:solidFill>
+                  <a:schemeClr val="accent1"/>
+                </a:solidFill>
+              </a14:hiddenFill>
+            </a:ext>
+            <a:ext uri="{91240B29-F687-4F45-9708-019B960494DF}">
+              <a14:hiddenLine xmlns:a14="http://schemas.microsoft.com/office/drawing/2010/main" w="9525">
+                <a:solidFill>
+                  <a:schemeClr val="tx1"/>
+                </a:solidFill>
+                <a:miter lim="800000"/>
+                <a:headEnd/>
+                <a:tailEnd/>
+              </a14:hiddenLine>
+            </a:ext>
+            <a:ext uri="{AF507438-7753-43E0-B8FC-AC1667EBCBE1}">
+              <a14:hiddenEffects xmlns:a14="http://schemas.microsoft.com/office/drawing/2010/main">
+                <a:effectLst>
+                  <a:outerShdw dist="35921" dir="2700000" algn="ctr" rotWithShape="0">
+                    <a:schemeClr val="bg2"/>
+                  </a:outerShdw>
+                </a:effectLst>
+              </a14:hiddenEffects>
+            </a:ext>
+          </a:extLst>
+        </p:spPr>
+      </p:pic>
+    </p:spTree>
+    <p:extLst>
+      <p:ext uri="{BB962C8B-B14F-4D97-AF65-F5344CB8AC3E}">
+        <p14:creationId xmlns:p14="http://schemas.microsoft.com/office/powerpoint/2010/main" val="2398498522"/>
+      </p:ext>
+    </p:extLst>
+  </p:cSld>
+  <p:clrMapOvr>
+    <a:masterClrMapping/>
+  </p:clrMapOvr>
+</p:sld>
+</file>
+
+<file path=ppt/slides/slide15.xml><?xml version="1.0" encoding="utf-8"?>
+<p:sld xmlns:a="http://schemas.openxmlformats.org/drawingml/2006/main" xmlns:r="http://schemas.openxmlformats.org/officeDocument/2006/relationships" xmlns:p="http://schemas.openxmlformats.org/presentationml/2006/main">
+  <p:cSld>
+    <p:spTree>
+      <p:nvGrpSpPr>
+        <p:cNvPr id="1" name=""/>
+        <p:cNvGrpSpPr/>
+        <p:nvPr/>
+      </p:nvGrpSpPr>
+      <p:grpSpPr>
+        <a:xfrm>
+          <a:off x="0" y="0"/>
+          <a:ext cx="0" cy="0"/>
+          <a:chOff x="0" y="0"/>
+          <a:chExt cx="0" cy="0"/>
+        </a:xfrm>
+      </p:grpSpPr>
+      <p:sp>
+        <p:nvSpPr>
+          <p:cNvPr id="2" name="Title 1"/>
+          <p:cNvSpPr>
+            <a:spLocks noGrp="1"/>
+          </p:cNvSpPr>
+          <p:nvPr>
+            <p:ph type="title"/>
+          </p:nvPr>
+        </p:nvSpPr>
+        <p:spPr/>
+        <p:txBody>
+          <a:bodyPr/>
+          <a:lstStyle/>
+          <a:p>
+            <a:r>
+              <a:rPr lang="en-US" dirty="0" smtClean="0"/>
+              <a:t>Cloud</a:t>
+            </a:r>
+            <a:endParaRPr lang="en-US" dirty="0"/>
+          </a:p>
+        </p:txBody>
+      </p:sp>
+      <p:pic>
+        <p:nvPicPr>
+          <p:cNvPr id="7170" name="Picture 2"/>
+          <p:cNvPicPr>
+            <a:picLocks noGrp="1" noChangeAspect="1" noChangeArrowheads="1"/>
+          </p:cNvPicPr>
+          <p:nvPr>
+            <p:ph idx="1"/>
+          </p:nvPr>
+        </p:nvPicPr>
+        <p:blipFill>
+          <a:blip r:embed="rId2">
+            <a:extLst>
+              <a:ext uri="{28A0092B-C50C-407E-A947-70E740481C1C}">
+                <a14:useLocalDpi xmlns:a14="http://schemas.microsoft.com/office/drawing/2010/main" val="0"/>
+              </a:ext>
+            </a:extLst>
+          </a:blip>
+          <a:srcRect/>
+          <a:stretch>
+            <a:fillRect/>
+          </a:stretch>
+        </p:blipFill>
+        <p:spPr bwMode="auto">
+          <a:xfrm>
+            <a:off x="1620601" y="1600200"/>
+            <a:ext cx="5902797" cy="4525963"/>
+          </a:xfrm>
+          <a:prstGeom prst="rect">
+            <a:avLst/>
+          </a:prstGeom>
+          <a:noFill/>
+          <a:ln>
+            <a:noFill/>
+          </a:ln>
+          <a:effectLst/>
+          <a:extLst>
+            <a:ext uri="{909E8E84-426E-40DD-AFC4-6F175D3DCCD1}">
+              <a14:hiddenFill xmlns:a14="http://schemas.microsoft.com/office/drawing/2010/main">
+                <a:solidFill>
+                  <a:schemeClr val="accent1"/>
+                </a:solidFill>
+              </a14:hiddenFill>
+            </a:ext>
+            <a:ext uri="{91240B29-F687-4F45-9708-019B960494DF}">
+              <a14:hiddenLine xmlns:a14="http://schemas.microsoft.com/office/drawing/2010/main" w="9525">
+                <a:solidFill>
+                  <a:schemeClr val="tx1"/>
+                </a:solidFill>
+                <a:miter lim="800000"/>
+                <a:headEnd/>
+                <a:tailEnd/>
+              </a14:hiddenLine>
+            </a:ext>
+            <a:ext uri="{AF507438-7753-43E0-B8FC-AC1667EBCBE1}">
+              <a14:hiddenEffects xmlns:a14="http://schemas.microsoft.com/office/drawing/2010/main">
+                <a:effectLst>
+                  <a:outerShdw dist="35921" dir="2700000" algn="ctr" rotWithShape="0">
+                    <a:schemeClr val="bg2"/>
+                  </a:outerShdw>
+                </a:effectLst>
+              </a14:hiddenEffects>
+            </a:ext>
+          </a:extLst>
+        </p:spPr>
+      </p:pic>
+    </p:spTree>
+    <p:extLst>
+      <p:ext uri="{BB962C8B-B14F-4D97-AF65-F5344CB8AC3E}">
+        <p14:creationId xmlns:p14="http://schemas.microsoft.com/office/powerpoint/2010/main" val="2541311510"/>
+      </p:ext>
+    </p:extLst>
+  </p:cSld>
+  <p:clrMapOvr>
+    <a:masterClrMapping/>
+  </p:clrMapOvr>
+</p:sld>
+</file>
+
+<file path=ppt/slides/slide16.xml><?xml version="1.0" encoding="utf-8"?>
+<p:sld xmlns:a="http://schemas.openxmlformats.org/drawingml/2006/main" xmlns:r="http://schemas.openxmlformats.org/officeDocument/2006/relationships" xmlns:p="http://schemas.openxmlformats.org/presentationml/2006/main">
+  <p:cSld>
+    <p:spTree>
+      <p:nvGrpSpPr>
+        <p:cNvPr id="1" name=""/>
+        <p:cNvGrpSpPr/>
+        <p:nvPr/>
+      </p:nvGrpSpPr>
+      <p:grpSpPr>
+        <a:xfrm>
+          <a:off x="0" y="0"/>
+          <a:ext cx="0" cy="0"/>
+          <a:chOff x="0" y="0"/>
+          <a:chExt cx="0" cy="0"/>
+        </a:xfrm>
+      </p:grpSpPr>
+      <p:sp>
+        <p:nvSpPr>
+          <p:cNvPr id="2" name="Title 1"/>
+          <p:cNvSpPr>
+            <a:spLocks noGrp="1"/>
+          </p:cNvSpPr>
+          <p:nvPr>
+            <p:ph type="title"/>
+          </p:nvPr>
+        </p:nvSpPr>
+        <p:spPr/>
+        <p:txBody>
+          <a:bodyPr/>
+          <a:lstStyle/>
+          <a:p>
+            <a:r>
+              <a:rPr lang="en-US" dirty="0" smtClean="0"/>
+              <a:t>Services</a:t>
+            </a:r>
+            <a:endParaRPr lang="en-US" dirty="0"/>
+          </a:p>
+        </p:txBody>
+      </p:sp>
+      <p:sp>
+        <p:nvSpPr>
+          <p:cNvPr id="3" name="Content Placeholder 2"/>
+          <p:cNvSpPr>
+            <a:spLocks noGrp="1"/>
+          </p:cNvSpPr>
+          <p:nvPr>
+            <p:ph idx="1"/>
+          </p:nvPr>
+        </p:nvSpPr>
+        <p:spPr/>
+        <p:txBody>
+          <a:bodyPr/>
+          <a:lstStyle/>
+          <a:p>
+            <a:r>
+              <a:rPr lang="en-US" sz="2000" dirty="0" smtClean="0"/>
+              <a:t>Why do we buy cloud computing from Amazon, an online bookstore?</a:t>
+            </a:r>
+          </a:p>
+          <a:p>
+            <a:r>
+              <a:rPr lang="en-US" sz="2000" dirty="0" smtClean="0"/>
+              <a:t>Steve </a:t>
+            </a:r>
+            <a:r>
+              <a:rPr lang="en-US" sz="2000" dirty="0" err="1" smtClean="0"/>
+              <a:t>Yegge’s</a:t>
+            </a:r>
+            <a:r>
+              <a:rPr lang="en-US" sz="2000" dirty="0" smtClean="0"/>
+              <a:t> Google Platform* rant:</a:t>
+            </a:r>
+          </a:p>
+          <a:p>
+            <a:pPr lvl="1"/>
+            <a:r>
+              <a:rPr lang="en-US" sz="1600" dirty="0" smtClean="0"/>
+              <a:t>All teams expose their data and functionality through service interfaces</a:t>
+            </a:r>
+          </a:p>
+          <a:p>
+            <a:pPr lvl="1"/>
+            <a:r>
+              <a:rPr lang="en-US" sz="1600" dirty="0" smtClean="0"/>
+              <a:t>Teams must communicate with each other through these interfaces</a:t>
+            </a:r>
+          </a:p>
+          <a:p>
+            <a:pPr lvl="1"/>
+            <a:r>
+              <a:rPr lang="en-US" sz="1600" dirty="0" smtClean="0"/>
+              <a:t>There will be no other form of </a:t>
+            </a:r>
+            <a:r>
+              <a:rPr lang="en-US" sz="1600" dirty="0" err="1" smtClean="0"/>
+              <a:t>interprocess</a:t>
+            </a:r>
+            <a:r>
+              <a:rPr lang="en-US" sz="1600" dirty="0" smtClean="0"/>
+              <a:t> communication allowed: no direct linking, no direct reads of another team’s data store, no shared-memory model, no back doors whatsoever</a:t>
+            </a:r>
+          </a:p>
+          <a:p>
+            <a:pPr lvl="1"/>
+            <a:r>
+              <a:rPr lang="en-US" sz="1600" dirty="0" smtClean="0"/>
+              <a:t>It doesn’t matter what technology is used</a:t>
+            </a:r>
+          </a:p>
+          <a:p>
+            <a:pPr lvl="1"/>
+            <a:r>
+              <a:rPr lang="en-US" sz="1600" dirty="0" smtClean="0"/>
+              <a:t>All service interfaces, without exception, must be designed from the ground up to be </a:t>
+            </a:r>
+            <a:r>
+              <a:rPr lang="en-US" sz="1600" dirty="0" err="1" smtClean="0"/>
+              <a:t>externalizable</a:t>
+            </a:r>
+            <a:r>
+              <a:rPr lang="en-US" sz="1600" dirty="0" smtClean="0"/>
+              <a:t>.</a:t>
+            </a:r>
+          </a:p>
+          <a:p>
+            <a:pPr lvl="1"/>
+            <a:r>
+              <a:rPr lang="en-US" sz="1600" dirty="0" smtClean="0"/>
+              <a:t>Anyone who doesn’t do this will be fired</a:t>
+            </a:r>
+          </a:p>
+          <a:p>
+            <a:endParaRPr lang="en-US" sz="2000" dirty="0" smtClean="0"/>
+          </a:p>
+          <a:p>
+            <a:r>
+              <a:rPr lang="en-US" sz="2000" dirty="0">
+                <a:hlinkClick r:id="rId2"/>
+              </a:rPr>
+              <a:t>http://news.ycombinator.com/item?id=3101876</a:t>
+            </a:r>
+            <a:endParaRPr lang="en-US" sz="2000" dirty="0"/>
+          </a:p>
+        </p:txBody>
+      </p:sp>
+    </p:spTree>
+    <p:extLst>
+      <p:ext uri="{BB962C8B-B14F-4D97-AF65-F5344CB8AC3E}">
+        <p14:creationId xmlns:p14="http://schemas.microsoft.com/office/powerpoint/2010/main" val="2660073888"/>
+      </p:ext>
+    </p:extLst>
+  </p:cSld>
+  <p:clrMapOvr>
+    <a:masterClrMapping/>
+  </p:clrMapOvr>
+</p:sld>
+</file>
+
+<file path=ppt/slides/slide17.xml><?xml version="1.0" encoding="utf-8"?>
+<p:sld xmlns:a="http://schemas.openxmlformats.org/drawingml/2006/main" xmlns:r="http://schemas.openxmlformats.org/officeDocument/2006/relationships" xmlns:p="http://schemas.openxmlformats.org/presentationml/2006/main">
+  <p:cSld>
+    <p:spTree>
+      <p:nvGrpSpPr>
+        <p:cNvPr id="1" name=""/>
+        <p:cNvGrpSpPr/>
+        <p:nvPr/>
+      </p:nvGrpSpPr>
+      <p:grpSpPr>
+        <a:xfrm>
+          <a:off x="0" y="0"/>
+          <a:ext cx="0" cy="0"/>
+          <a:chOff x="0" y="0"/>
+          <a:chExt cx="0" cy="0"/>
+        </a:xfrm>
+      </p:grpSpPr>
+      <p:sp>
+        <p:nvSpPr>
+          <p:cNvPr id="2" name="Title 1"/>
+          <p:cNvSpPr>
+            <a:spLocks noGrp="1"/>
+          </p:cNvSpPr>
+          <p:nvPr>
+            <p:ph type="title"/>
+          </p:nvPr>
+        </p:nvSpPr>
+        <p:spPr/>
+        <p:txBody>
+          <a:bodyPr/>
+          <a:lstStyle/>
+          <a:p>
+            <a:r>
+              <a:rPr lang="en-US" dirty="0" smtClean="0"/>
               <a:t>Services</a:t>
             </a:r>
             <a:endParaRPr lang="en-US" dirty="0"/>
@@ -4685,7 +5557,7 @@
 </p:sld>
 </file>
 
-<file path=ppt/slides/slide11.xml><?xml version="1.0" encoding="utf-8"?>
+<file path=ppt/slides/slide18.xml><?xml version="1.0" encoding="utf-8"?>
 <p:sld xmlns:a="http://schemas.openxmlformats.org/drawingml/2006/main" xmlns:r="http://schemas.openxmlformats.org/officeDocument/2006/relationships" xmlns:p="http://schemas.openxmlformats.org/presentationml/2006/main">
   <p:cSld>
     <p:bg>
@@ -5068,80 +5940,84 @@
             </a:pPr>
             <a:r>
               <a:rPr lang="en-US" sz="1600" dirty="0" smtClean="0"/>
-              <a:t>We are in a research institution whose output is academic publications – and yet, we do not apply the same processes of peer-review, independent verification, and publication to our software.</a:t>
+              <a:t>We are in a research institution whose output is academic publications – and yet, we do not apply the same processes of peer-review, independent verification, and publication to our software</a:t>
+            </a:r>
+            <a:r>
+              <a:rPr lang="en-US" sz="1600" dirty="0" smtClean="0"/>
+              <a:t>.</a:t>
             </a:r>
           </a:p>
           <a:p>
             <a:pPr marL="0" indent="0">
               <a:buNone/>
             </a:pPr>
-            <a:r>
-              <a:rPr lang="en-US" sz="1600" dirty="0" smtClean="0"/>
-              <a:t>We don’t even fully consult with the intended users of our software before we design it!</a:t>
-            </a:r>
+            <a:endParaRPr lang="en-US" sz="1600" dirty="0"/>
           </a:p>
           <a:p>
             <a:pPr marL="0" indent="0">
               <a:buNone/>
             </a:pPr>
             <a:r>
-              <a:rPr lang="en-US" sz="1600" dirty="0" smtClean="0"/>
-              <a:t>And we rarely get their input while we’re writing it!</a:t>
-            </a:r>
-          </a:p>
-          <a:p>
-            <a:r>
-              <a:rPr lang="en-US" sz="1600" dirty="0" smtClean="0"/>
-              <a:t>Not </a:t>
-            </a:r>
-            <a:r>
-              <a:rPr lang="en-US" sz="1600" dirty="0" smtClean="0"/>
-              <a:t>Invented Here </a:t>
-            </a:r>
-            <a:r>
-              <a:rPr lang="en-US" sz="1600" dirty="0" smtClean="0"/>
-              <a:t>syndrome</a:t>
-            </a:r>
-          </a:p>
-          <a:p>
-            <a:r>
-              <a:rPr lang="en-US" sz="1600" dirty="0" smtClean="0"/>
-              <a:t>Who fixes problems?</a:t>
-            </a:r>
-          </a:p>
-          <a:p>
-            <a:r>
-              <a:rPr lang="en-US" sz="1600" dirty="0" smtClean="0"/>
-              <a:t>(blame game chart)</a:t>
-            </a:r>
-            <a:endParaRPr lang="en-US" sz="1600" dirty="0"/>
-          </a:p>
-          <a:p>
-            <a:endParaRPr lang="en-US" sz="1600" dirty="0" smtClean="0"/>
-          </a:p>
-          <a:p>
-            <a:endParaRPr lang="en-US" sz="1600" dirty="0"/>
-          </a:p>
-          <a:p>
-            <a:endParaRPr lang="en-US" sz="1600" dirty="0" smtClean="0"/>
-          </a:p>
-          <a:p>
-            <a:endParaRPr lang="en-US" sz="1600" dirty="0"/>
-          </a:p>
-          <a:p>
-            <a:endParaRPr lang="en-US" sz="1600" dirty="0" smtClean="0"/>
+              <a:rPr lang="en-US" sz="2800" dirty="0" smtClean="0"/>
+              <a:t>Publish!</a:t>
+            </a:r>
           </a:p>
           <a:p>
             <a:pPr marL="0" indent="0">
               <a:buNone/>
             </a:pPr>
+            <a:endParaRPr lang="en-US" sz="1600" dirty="0" smtClean="0"/>
+          </a:p>
+          <a:p>
+            <a:pPr marL="0" indent="0">
+              <a:buNone/>
+            </a:pPr>
             <a:r>
               <a:rPr lang="en-US" sz="1600" dirty="0" smtClean="0"/>
-              <a:t>=  </a:t>
-            </a:r>
+              <a:t>We don’t even fully consult with the intended users of our software before we design it!</a:t>
+            </a:r>
+          </a:p>
+          <a:p>
+            <a:pPr marL="0" indent="0">
+              <a:buNone/>
+            </a:pPr>
             <a:r>
               <a:rPr lang="en-US" sz="1600" dirty="0" smtClean="0"/>
-              <a:t>We are still working on the balance between central and departmental services</a:t>
+              <a:t>And we rarely get their input while we’re writing it!</a:t>
+            </a:r>
+          </a:p>
+          <a:p>
+            <a:r>
+              <a:rPr lang="en-US" sz="1600" dirty="0" smtClean="0"/>
+              <a:t>Not Invented Here syndrome</a:t>
+            </a:r>
+          </a:p>
+          <a:p>
+            <a:r>
+              <a:rPr lang="en-US" sz="1600" dirty="0" smtClean="0"/>
+              <a:t>Who fixes problems?</a:t>
+            </a:r>
+          </a:p>
+          <a:p>
+            <a:pPr marL="0" indent="0">
+              <a:buNone/>
+            </a:pPr>
+            <a:r>
+              <a:rPr lang="en-US" sz="2800" dirty="0" smtClean="0"/>
+              <a:t>Peer Review!</a:t>
+            </a:r>
+            <a:endParaRPr lang="en-US" sz="2800" dirty="0"/>
+          </a:p>
+          <a:p>
+            <a:endParaRPr lang="en-US" sz="1600" dirty="0" smtClean="0"/>
+          </a:p>
+          <a:p>
+            <a:pPr marL="0" indent="0">
+              <a:buNone/>
+            </a:pPr>
+            <a:r>
+              <a:rPr lang="en-US" sz="1600" dirty="0" smtClean="0"/>
+              <a:t>=  We are still working on the balance between central and departmental services</a:t>
             </a:r>
           </a:p>
           <a:p>
@@ -5340,9 +6216,8 @@
           <a:bodyPr/>
           <a:lstStyle/>
           <a:p>
-            <a:pPr marL="342900" lvl="1" indent="-342900">
-              <a:buFontTx/>
-              <a:buChar char="•"/>
+            <a:pPr marL="0" lvl="1" indent="0">
+              <a:buNone/>
             </a:pPr>
             <a:r>
               <a:rPr lang="en-US" dirty="0" smtClean="0"/>
@@ -5356,6 +6231,7 @@
               <a:rPr lang="en-US" dirty="0" smtClean="0"/>
               <a:t>relationship</a:t>
             </a:r>
+            <a:endParaRPr lang="en-US" dirty="0" smtClean="0"/>
           </a:p>
           <a:p>
             <a:r>
@@ -5432,8 +6308,26 @@
             </a:r>
             <a:r>
               <a:rPr lang="en-US" sz="1600" dirty="0"/>
-              <a:t>, etc.)</a:t>
-            </a:r>
+              <a:t>, etc</a:t>
+            </a:r>
+            <a:r>
+              <a:rPr lang="en-US" sz="1600" dirty="0" smtClean="0"/>
+              <a:t>.)</a:t>
+            </a:r>
+          </a:p>
+          <a:p>
+            <a:pPr lvl="1"/>
+            <a:endParaRPr lang="en-US" sz="1600" dirty="0"/>
+          </a:p>
+          <a:p>
+            <a:pPr marL="0" indent="0">
+              <a:buNone/>
+            </a:pPr>
+            <a:r>
+              <a:rPr lang="en-US" sz="2800" dirty="0" smtClean="0"/>
+              <a:t>Publish/Peer Review</a:t>
+            </a:r>
+            <a:endParaRPr lang="en-US" sz="2800" dirty="0"/>
           </a:p>
           <a:p>
             <a:pPr marL="342900" lvl="1" indent="-342900">
@@ -6146,122 +7040,82 @@
           <a:p>
             <a:r>
               <a:rPr lang="en-US" dirty="0" smtClean="0"/>
-              <a:t>Services</a:t>
+              <a:t>Cloud</a:t>
             </a:r>
             <a:endParaRPr lang="en-US" dirty="0"/>
           </a:p>
         </p:txBody>
       </p:sp>
-      <p:sp>
-        <p:nvSpPr>
-          <p:cNvPr id="3" name="Content Placeholder 2"/>
-          <p:cNvSpPr>
-            <a:spLocks noGrp="1"/>
-          </p:cNvSpPr>
+      <p:pic>
+        <p:nvPicPr>
+          <p:cNvPr id="1026" name="Picture 2"/>
+          <p:cNvPicPr>
+            <a:picLocks noGrp="1" noChangeAspect="1" noChangeArrowheads="1"/>
+          </p:cNvPicPr>
           <p:nvPr>
             <p:ph idx="1"/>
           </p:nvPr>
-        </p:nvSpPr>
-        <p:spPr/>
-        <p:txBody>
-          <a:bodyPr/>
-          <a:lstStyle/>
-          <a:p>
-            <a:r>
-              <a:rPr lang="en-US" sz="2000" dirty="0" smtClean="0"/>
-              <a:t>Why do we buy cloud computing from Amazon, an online bookstore?</a:t>
-            </a:r>
-          </a:p>
-          <a:p>
-            <a:r>
-              <a:rPr lang="en-US" sz="2000" dirty="0" smtClean="0"/>
-              <a:t>Steve </a:t>
-            </a:r>
-            <a:r>
-              <a:rPr lang="en-US" sz="2000" dirty="0" err="1" smtClean="0"/>
-              <a:t>Yegge’s</a:t>
-            </a:r>
-            <a:r>
-              <a:rPr lang="en-US" sz="2000" dirty="0" smtClean="0"/>
-              <a:t> Google Platform* rant:</a:t>
-            </a:r>
-          </a:p>
-          <a:p>
-            <a:pPr lvl="1"/>
-            <a:r>
-              <a:rPr lang="en-US" sz="1600" dirty="0" smtClean="0"/>
-              <a:t>All teams expose their data and functionality through service interfaces</a:t>
-            </a:r>
-          </a:p>
-          <a:p>
-            <a:pPr lvl="1"/>
-            <a:r>
-              <a:rPr lang="en-US" sz="1600" dirty="0" smtClean="0"/>
-              <a:t>Teams must communicate with each other through these interfaces</a:t>
-            </a:r>
-          </a:p>
-          <a:p>
-            <a:pPr lvl="1"/>
-            <a:r>
-              <a:rPr lang="en-US" sz="1600" dirty="0" smtClean="0"/>
-              <a:t>There will be no other form of </a:t>
-            </a:r>
-            <a:r>
-              <a:rPr lang="en-US" sz="1600" dirty="0" err="1" smtClean="0"/>
-              <a:t>interprocess</a:t>
-            </a:r>
-            <a:r>
-              <a:rPr lang="en-US" sz="1600" dirty="0" smtClean="0"/>
-              <a:t> communication allowed: no direct linking, no direct reads of another team’s data store, no shared-memory model, no back doors whatsoever</a:t>
-            </a:r>
-          </a:p>
-          <a:p>
-            <a:pPr lvl="1"/>
-            <a:r>
-              <a:rPr lang="en-US" sz="1600" dirty="0" smtClean="0"/>
-              <a:t>It doesn’t matter what technology is used</a:t>
-            </a:r>
-          </a:p>
-          <a:p>
-            <a:pPr lvl="1"/>
-            <a:r>
-              <a:rPr lang="en-US" sz="1600" dirty="0" smtClean="0"/>
-              <a:t>All service interfaces, without exception, must be designed from the ground up to be </a:t>
-            </a:r>
-            <a:r>
-              <a:rPr lang="en-US" sz="1600" dirty="0" err="1" smtClean="0"/>
-              <a:t>externalizable</a:t>
-            </a:r>
-            <a:r>
-              <a:rPr lang="en-US" sz="1600" dirty="0" smtClean="0"/>
-              <a:t>.</a:t>
-            </a:r>
-          </a:p>
-          <a:p>
-            <a:pPr lvl="1"/>
-            <a:r>
-              <a:rPr lang="en-US" sz="1600" dirty="0" smtClean="0"/>
-              <a:t>Anyone who doesn’t do this will be fired</a:t>
-            </a:r>
-          </a:p>
-          <a:p>
-            <a:endParaRPr lang="en-US" sz="2000" dirty="0" smtClean="0"/>
-          </a:p>
-          <a:p>
-            <a:r>
-              <a:rPr lang="en-US" sz="2000" dirty="0">
-                <a:hlinkClick r:id="rId2"/>
-              </a:rPr>
-              <a:t>http://news.ycombinator.com/item?id=3101876</a:t>
-            </a:r>
-            <a:endParaRPr lang="en-US" sz="2000" dirty="0"/>
-          </a:p>
-        </p:txBody>
-      </p:sp>
+        </p:nvPicPr>
+        <p:blipFill>
+          <a:blip r:embed="rId2">
+            <a:extLst>
+              <a:ext uri="{28A0092B-C50C-407E-A947-70E740481C1C}">
+                <a14:useLocalDpi xmlns:a14="http://schemas.microsoft.com/office/drawing/2010/main" val="0"/>
+              </a:ext>
+            </a:extLst>
+          </a:blip>
+          <a:srcRect/>
+          <a:stretch>
+            <a:fillRect/>
+          </a:stretch>
+        </p:blipFill>
+        <p:spPr bwMode="auto">
+          <a:xfrm>
+            <a:off x="1616492" y="1600200"/>
+            <a:ext cx="5911015" cy="4525963"/>
+          </a:xfrm>
+          <a:prstGeom prst="rect">
+            <a:avLst/>
+          </a:prstGeom>
+          <a:noFill/>
+          <a:ln>
+            <a:noFill/>
+          </a:ln>
+          <a:effectLst/>
+          <a:extLst>
+            <a:ext uri="{909E8E84-426E-40DD-AFC4-6F175D3DCCD1}">
+              <a14:hiddenFill xmlns:a14="http://schemas.microsoft.com/office/drawing/2010/main">
+                <a:solidFill>
+                  <a:schemeClr val="accent1"/>
+                </a:solidFill>
+              </a14:hiddenFill>
+            </a:ext>
+            <a:ext uri="{91240B29-F687-4F45-9708-019B960494DF}">
+              <a14:hiddenLine xmlns:a14="http://schemas.microsoft.com/office/drawing/2010/main" w="9525">
+                <a:solidFill>
+                  <a:schemeClr val="tx1"/>
+                </a:solidFill>
+                <a:miter lim="800000"/>
+                <a:headEnd/>
+                <a:tailEnd/>
+              </a14:hiddenLine>
+            </a:ext>
+            <a:ext uri="{AF507438-7753-43E0-B8FC-AC1667EBCBE1}">
+              <a14:hiddenEffects xmlns:a14="http://schemas.microsoft.com/office/drawing/2010/main">
+                <a:effectLst>
+                  <a:outerShdw dist="35921" dir="2700000" algn="ctr" rotWithShape="0">
+                    <a:schemeClr val="bg2"/>
+                  </a:outerShdw>
+                </a:effectLst>
+              </a14:hiddenEffects>
+            </a:ext>
+          </a:extLst>
+        </p:spPr>
+      </p:pic>
     </p:spTree>
     <p:extLst>
       <p:ext uri="{BB962C8B-B14F-4D97-AF65-F5344CB8AC3E}">
-        <p14:creationId xmlns:p14="http://schemas.microsoft.com/office/powerpoint/2010/main" val="2660073888"/>
+        <p14:creationId xmlns:p14="http://schemas.microsoft.com/office/powerpoint/2010/main" val="4087146101"/>
       </p:ext>
     </p:extLst>
   </p:cSld>

</xml_diff>